<commit_message>
added 2nd title slide
</commit_message>
<xml_diff>
--- a/slides.pptx
+++ b/slides.pptx
@@ -6,6 +6,7 @@
   </p:sldMasterIdLst>
   <p:sldIdLst>
     <p:sldId id="256" r:id="rId2"/>
+    <p:sldId id="267" r:id="rId3"/>
   </p:sldIdLst>
   <p:sldSz cx="12192000" cy="6858000"/>
   <p:notesSz cx="6858000" cy="9144000"/>
@@ -104,6 +105,11 @@
       </a:defRPr>
     </a:lvl9pPr>
   </p:defaultTextStyle>
+  <p:extLst>
+    <p:ext uri="{EFAFB233-063F-42B5-8137-9DF3F51BA10A}">
+      <p15:sldGuideLst xmlns:p15="http://schemas.microsoft.com/office/powerpoint/2012/main"/>
+    </p:ext>
+  </p:extLst>
 </p:presentation>
 </file>
 
@@ -254,7 +260,7 @@
           <a:p>
             <a:fld id="{1F9E4FA3-09EB-420E-8B8D-1F38C173CA1D}" type="datetimeFigureOut">
               <a:rPr lang="fr-FR" smtClean="0"/>
-              <a:t>12/09/2022</a:t>
+              <a:t>14/09/2022</a:t>
             </a:fld>
             <a:endParaRPr lang="fr-FR"/>
           </a:p>
@@ -452,7 +458,7 @@
           <a:p>
             <a:fld id="{1F9E4FA3-09EB-420E-8B8D-1F38C173CA1D}" type="datetimeFigureOut">
               <a:rPr lang="fr-FR" smtClean="0"/>
-              <a:t>12/09/2022</a:t>
+              <a:t>14/09/2022</a:t>
             </a:fld>
             <a:endParaRPr lang="fr-FR"/>
           </a:p>
@@ -660,7 +666,7 @@
           <a:p>
             <a:fld id="{1F9E4FA3-09EB-420E-8B8D-1F38C173CA1D}" type="datetimeFigureOut">
               <a:rPr lang="fr-FR" smtClean="0"/>
-              <a:t>12/09/2022</a:t>
+              <a:t>14/09/2022</a:t>
             </a:fld>
             <a:endParaRPr lang="fr-FR"/>
           </a:p>
@@ -858,7 +864,7 @@
           <a:p>
             <a:fld id="{1F9E4FA3-09EB-420E-8B8D-1F38C173CA1D}" type="datetimeFigureOut">
               <a:rPr lang="fr-FR" smtClean="0"/>
-              <a:t>12/09/2022</a:t>
+              <a:t>14/09/2022</a:t>
             </a:fld>
             <a:endParaRPr lang="fr-FR"/>
           </a:p>
@@ -1133,7 +1139,7 @@
           <a:p>
             <a:fld id="{1F9E4FA3-09EB-420E-8B8D-1F38C173CA1D}" type="datetimeFigureOut">
               <a:rPr lang="fr-FR" smtClean="0"/>
-              <a:t>12/09/2022</a:t>
+              <a:t>14/09/2022</a:t>
             </a:fld>
             <a:endParaRPr lang="fr-FR"/>
           </a:p>
@@ -1398,7 +1404,7 @@
           <a:p>
             <a:fld id="{1F9E4FA3-09EB-420E-8B8D-1F38C173CA1D}" type="datetimeFigureOut">
               <a:rPr lang="fr-FR" smtClean="0"/>
-              <a:t>12/09/2022</a:t>
+              <a:t>14/09/2022</a:t>
             </a:fld>
             <a:endParaRPr lang="fr-FR"/>
           </a:p>
@@ -1810,7 +1816,7 @@
           <a:p>
             <a:fld id="{1F9E4FA3-09EB-420E-8B8D-1F38C173CA1D}" type="datetimeFigureOut">
               <a:rPr lang="fr-FR" smtClean="0"/>
-              <a:t>12/09/2022</a:t>
+              <a:t>14/09/2022</a:t>
             </a:fld>
             <a:endParaRPr lang="fr-FR"/>
           </a:p>
@@ -1951,7 +1957,7 @@
           <a:p>
             <a:fld id="{1F9E4FA3-09EB-420E-8B8D-1F38C173CA1D}" type="datetimeFigureOut">
               <a:rPr lang="fr-FR" smtClean="0"/>
-              <a:t>12/09/2022</a:t>
+              <a:t>14/09/2022</a:t>
             </a:fld>
             <a:endParaRPr lang="fr-FR"/>
           </a:p>
@@ -2064,7 +2070,7 @@
           <a:p>
             <a:fld id="{1F9E4FA3-09EB-420E-8B8D-1F38C173CA1D}" type="datetimeFigureOut">
               <a:rPr lang="fr-FR" smtClean="0"/>
-              <a:t>12/09/2022</a:t>
+              <a:t>14/09/2022</a:t>
             </a:fld>
             <a:endParaRPr lang="fr-FR"/>
           </a:p>
@@ -2375,7 +2381,7 @@
           <a:p>
             <a:fld id="{1F9E4FA3-09EB-420E-8B8D-1F38C173CA1D}" type="datetimeFigureOut">
               <a:rPr lang="fr-FR" smtClean="0"/>
-              <a:t>12/09/2022</a:t>
+              <a:t>14/09/2022</a:t>
             </a:fld>
             <a:endParaRPr lang="fr-FR"/>
           </a:p>
@@ -2663,7 +2669,7 @@
           <a:p>
             <a:fld id="{1F9E4FA3-09EB-420E-8B8D-1F38C173CA1D}" type="datetimeFigureOut">
               <a:rPr lang="fr-FR" smtClean="0"/>
-              <a:t>12/09/2022</a:t>
+              <a:t>14/09/2022</a:t>
             </a:fld>
             <a:endParaRPr lang="fr-FR"/>
           </a:p>
@@ -2904,7 +2910,7 @@
           <a:p>
             <a:fld id="{1F9E4FA3-09EB-420E-8B8D-1F38C173CA1D}" type="datetimeFigureOut">
               <a:rPr lang="fr-FR" smtClean="0"/>
-              <a:t>12/09/2022</a:t>
+              <a:t>14/09/2022</a:t>
             </a:fld>
             <a:endParaRPr lang="fr-FR"/>
           </a:p>
@@ -3435,6 +3441,103 @@
 </p:sld>
 </file>
 
+<file path=ppt/slides/slide2.xml><?xml version="1.0" encoding="utf-8"?>
+<p:sld xmlns:a="http://schemas.openxmlformats.org/drawingml/2006/main" xmlns:r="http://schemas.openxmlformats.org/officeDocument/2006/relationships" xmlns:p="http://schemas.openxmlformats.org/presentationml/2006/main">
+  <p:cSld>
+    <p:spTree>
+      <p:nvGrpSpPr>
+        <p:cNvPr id="1" name=""/>
+        <p:cNvGrpSpPr/>
+        <p:nvPr/>
+      </p:nvGrpSpPr>
+      <p:grpSpPr>
+        <a:xfrm>
+          <a:off x="0" y="0"/>
+          <a:ext cx="0" cy="0"/>
+          <a:chOff x="0" y="0"/>
+          <a:chExt cx="0" cy="0"/>
+        </a:xfrm>
+      </p:grpSpPr>
+      <p:sp>
+        <p:nvSpPr>
+          <p:cNvPr id="4" name="Titre 3">
+            <a:extLst>
+              <a:ext uri="{FF2B5EF4-FFF2-40B4-BE49-F238E27FC236}">
+                <a16:creationId xmlns:a16="http://schemas.microsoft.com/office/drawing/2014/main" id="{1D76D3CE-724C-57F7-99AE-B07727C73835}"/>
+              </a:ext>
+            </a:extLst>
+          </p:cNvPr>
+          <p:cNvSpPr>
+            <a:spLocks noGrp="1"/>
+          </p:cNvSpPr>
+          <p:nvPr>
+            <p:ph type="title"/>
+          </p:nvPr>
+        </p:nvSpPr>
+        <p:spPr/>
+        <p:txBody>
+          <a:bodyPr/>
+          <a:lstStyle/>
+          <a:p>
+            <a:pPr algn="ctr"/>
+            <a:r>
+              <a:rPr lang="fr-FR" b="1" dirty="0"/>
+              <a:t>Ou comment faire passer un secret avec un haut parleur…</a:t>
+            </a:r>
+          </a:p>
+        </p:txBody>
+      </p:sp>
+      <p:pic>
+        <p:nvPicPr>
+          <p:cNvPr id="7" name="Espace réservé du contenu 6">
+            <a:extLst>
+              <a:ext uri="{FF2B5EF4-FFF2-40B4-BE49-F238E27FC236}">
+                <a16:creationId xmlns:a16="http://schemas.microsoft.com/office/drawing/2014/main" id="{2E6AE29E-E2D6-1A14-3083-559229F4A444}"/>
+              </a:ext>
+            </a:extLst>
+          </p:cNvPr>
+          <p:cNvPicPr>
+            <a:picLocks noGrp="1" noChangeAspect="1"/>
+          </p:cNvPicPr>
+          <p:nvPr>
+            <p:ph idx="1"/>
+          </p:nvPr>
+        </p:nvPicPr>
+        <p:blipFill>
+          <a:blip r:embed="rId2">
+            <a:extLst>
+              <a:ext uri="{28A0092B-C50C-407E-A947-70E740481C1C}">
+                <a14:useLocalDpi xmlns:a14="http://schemas.microsoft.com/office/drawing/2010/main" val="0"/>
+              </a:ext>
+              <a:ext uri="{96DAC541-7B7A-43D3-8B79-37D633B846F1}">
+                <asvg:svgBlip xmlns:asvg="http://schemas.microsoft.com/office/drawing/2016/SVG/main" r:embed="rId3"/>
+              </a:ext>
+            </a:extLst>
+          </a:blip>
+          <a:stretch>
+            <a:fillRect/>
+          </a:stretch>
+        </p:blipFill>
+        <p:spPr>
+          <a:xfrm>
+            <a:off x="3195108" y="1850746"/>
+            <a:ext cx="5801784" cy="4351338"/>
+          </a:xfrm>
+        </p:spPr>
+      </p:pic>
+    </p:spTree>
+    <p:extLst>
+      <p:ext uri="{BB962C8B-B14F-4D97-AF65-F5344CB8AC3E}">
+        <p14:creationId xmlns:p14="http://schemas.microsoft.com/office/powerpoint/2010/main" val="2249693919"/>
+      </p:ext>
+    </p:extLst>
+  </p:cSld>
+  <p:clrMapOvr>
+    <a:masterClrMapping/>
+  </p:clrMapOvr>
+</p:sld>
+</file>
+
 <file path=ppt/theme/theme1.xml><?xml version="1.0" encoding="utf-8"?>
 <a:theme xmlns:a="http://schemas.openxmlformats.org/drawingml/2006/main" name="Thème Office">
   <a:themeElements>

</xml_diff>

<commit_message>
added intro questions (with images from web)
</commit_message>
<xml_diff>
--- a/slides.pptx
+++ b/slides.pptx
@@ -7,6 +7,10 @@
   <p:sldIdLst>
     <p:sldId id="256" r:id="rId2"/>
     <p:sldId id="267" r:id="rId3"/>
+    <p:sldId id="257" r:id="rId4"/>
+    <p:sldId id="261" r:id="rId5"/>
+    <p:sldId id="262" r:id="rId6"/>
+    <p:sldId id="263" r:id="rId7"/>
   </p:sldIdLst>
   <p:sldSz cx="12192000" cy="6858000"/>
   <p:notesSz cx="6858000" cy="9144000"/>
@@ -3538,6 +3542,492 @@
 </p:sld>
 </file>
 
+<file path=ppt/slides/slide3.xml><?xml version="1.0" encoding="utf-8"?>
+<p:sld xmlns:a="http://schemas.openxmlformats.org/drawingml/2006/main" xmlns:r="http://schemas.openxmlformats.org/officeDocument/2006/relationships" xmlns:p="http://schemas.openxmlformats.org/presentationml/2006/main">
+  <p:cSld>
+    <p:spTree>
+      <p:nvGrpSpPr>
+        <p:cNvPr id="1" name=""/>
+        <p:cNvGrpSpPr/>
+        <p:nvPr/>
+      </p:nvGrpSpPr>
+      <p:grpSpPr>
+        <a:xfrm>
+          <a:off x="0" y="0"/>
+          <a:ext cx="0" cy="0"/>
+          <a:chOff x="0" y="0"/>
+          <a:chExt cx="0" cy="0"/>
+        </a:xfrm>
+      </p:grpSpPr>
+      <p:pic>
+        <p:nvPicPr>
+          <p:cNvPr id="3" name="Image 2">
+            <a:extLst>
+              <a:ext uri="{FF2B5EF4-FFF2-40B4-BE49-F238E27FC236}">
+                <a16:creationId xmlns:a16="http://schemas.microsoft.com/office/drawing/2014/main" id="{A4788B1C-652B-33B9-5968-ACB8F258305B}"/>
+              </a:ext>
+            </a:extLst>
+          </p:cNvPr>
+          <p:cNvPicPr>
+            <a:picLocks noChangeAspect="1"/>
+          </p:cNvPicPr>
+          <p:nvPr/>
+        </p:nvPicPr>
+        <p:blipFill rotWithShape="1">
+          <a:blip r:embed="rId2"/>
+          <a:srcRect t="4273"/>
+          <a:stretch/>
+        </p:blipFill>
+        <p:spPr>
+          <a:xfrm>
+            <a:off x="20" y="1282"/>
+            <a:ext cx="12191980" cy="6856718"/>
+          </a:xfrm>
+          <a:prstGeom prst="rect">
+            <a:avLst/>
+          </a:prstGeom>
+        </p:spPr>
+      </p:pic>
+      <p:sp>
+        <p:nvSpPr>
+          <p:cNvPr id="4" name="Titre 3">
+            <a:extLst>
+              <a:ext uri="{FF2B5EF4-FFF2-40B4-BE49-F238E27FC236}">
+                <a16:creationId xmlns:a16="http://schemas.microsoft.com/office/drawing/2014/main" id="{FD5584B7-531A-7DD7-0287-7D504A7483F7}"/>
+              </a:ext>
+            </a:extLst>
+          </p:cNvPr>
+          <p:cNvSpPr>
+            <a:spLocks noGrp="1"/>
+          </p:cNvSpPr>
+          <p:nvPr>
+            <p:ph type="title"/>
+          </p:nvPr>
+        </p:nvSpPr>
+        <p:spPr>
+          <a:xfrm>
+            <a:off x="838200" y="365125"/>
+            <a:ext cx="10515600" cy="5749297"/>
+          </a:xfrm>
+          <a:effectLst>
+            <a:glow rad="127000">
+              <a:schemeClr val="tx1"/>
+            </a:glow>
+          </a:effectLst>
+        </p:spPr>
+        <p:txBody>
+          <a:bodyPr>
+            <a:normAutofit/>
+          </a:bodyPr>
+          <a:lstStyle/>
+          <a:p>
+            <a:pPr algn="ctr"/>
+            <a:r>
+              <a:rPr lang="fr-FR" sz="6600" b="1" dirty="0">
+                <a:solidFill>
+                  <a:srgbClr val="FF0000"/>
+                </a:solidFill>
+                <a:effectLst>
+                  <a:glow rad="127000">
+                    <a:schemeClr val="bg1"/>
+                  </a:glow>
+                </a:effectLst>
+              </a:rPr>
+              <a:t>Aimez-vous les équations?</a:t>
+            </a:r>
+          </a:p>
+        </p:txBody>
+      </p:sp>
+    </p:spTree>
+    <p:extLst>
+      <p:ext uri="{BB962C8B-B14F-4D97-AF65-F5344CB8AC3E}">
+        <p14:creationId xmlns:p14="http://schemas.microsoft.com/office/powerpoint/2010/main" val="1318748251"/>
+      </p:ext>
+    </p:extLst>
+  </p:cSld>
+  <p:clrMapOvr>
+    <a:masterClrMapping/>
+  </p:clrMapOvr>
+</p:sld>
+</file>
+
+<file path=ppt/slides/slide4.xml><?xml version="1.0" encoding="utf-8"?>
+<p:sld xmlns:a="http://schemas.openxmlformats.org/drawingml/2006/main" xmlns:r="http://schemas.openxmlformats.org/officeDocument/2006/relationships" xmlns:p="http://schemas.openxmlformats.org/presentationml/2006/main">
+  <p:cSld>
+    <p:spTree>
+      <p:nvGrpSpPr>
+        <p:cNvPr id="1" name=""/>
+        <p:cNvGrpSpPr/>
+        <p:nvPr/>
+      </p:nvGrpSpPr>
+      <p:grpSpPr>
+        <a:xfrm>
+          <a:off x="0" y="0"/>
+          <a:ext cx="0" cy="0"/>
+          <a:chOff x="0" y="0"/>
+          <a:chExt cx="0" cy="0"/>
+        </a:xfrm>
+      </p:grpSpPr>
+      <p:sp>
+        <p:nvSpPr>
+          <p:cNvPr id="2" name="Rectangle 1">
+            <a:extLst>
+              <a:ext uri="{FF2B5EF4-FFF2-40B4-BE49-F238E27FC236}">
+                <a16:creationId xmlns:a16="http://schemas.microsoft.com/office/drawing/2014/main" id="{9588D97C-8FE2-70BC-3E29-BFB47E75E6B6}"/>
+              </a:ext>
+            </a:extLst>
+          </p:cNvPr>
+          <p:cNvSpPr/>
+          <p:nvPr/>
+        </p:nvSpPr>
+        <p:spPr>
+          <a:xfrm>
+            <a:off x="0" y="0"/>
+            <a:ext cx="12192000" cy="6858000"/>
+          </a:xfrm>
+          <a:prstGeom prst="rect">
+            <a:avLst/>
+          </a:prstGeom>
+          <a:ln>
+            <a:noFill/>
+          </a:ln>
+        </p:spPr>
+        <p:style>
+          <a:lnRef idx="2">
+            <a:schemeClr val="dk1">
+              <a:shade val="50000"/>
+            </a:schemeClr>
+          </a:lnRef>
+          <a:fillRef idx="1">
+            <a:schemeClr val="dk1"/>
+          </a:fillRef>
+          <a:effectRef idx="0">
+            <a:schemeClr val="dk1"/>
+          </a:effectRef>
+          <a:fontRef idx="minor">
+            <a:schemeClr val="lt1"/>
+          </a:fontRef>
+        </p:style>
+        <p:txBody>
+          <a:bodyPr rtlCol="0" anchor="ctr"/>
+          <a:lstStyle/>
+          <a:p>
+            <a:pPr algn="ctr"/>
+            <a:endParaRPr lang="fr-FR"/>
+          </a:p>
+        </p:txBody>
+      </p:sp>
+      <p:pic>
+        <p:nvPicPr>
+          <p:cNvPr id="5" name="Image 4">
+            <a:extLst>
+              <a:ext uri="{FF2B5EF4-FFF2-40B4-BE49-F238E27FC236}">
+                <a16:creationId xmlns:a16="http://schemas.microsoft.com/office/drawing/2014/main" id="{80898E81-E45F-B7FE-C8AF-81221336EEAF}"/>
+              </a:ext>
+            </a:extLst>
+          </p:cNvPr>
+          <p:cNvPicPr>
+            <a:picLocks noChangeAspect="1"/>
+          </p:cNvPicPr>
+          <p:nvPr/>
+        </p:nvPicPr>
+        <p:blipFill>
+          <a:blip r:embed="rId2"/>
+          <a:stretch>
+            <a:fillRect/>
+          </a:stretch>
+        </p:blipFill>
+        <p:spPr>
+          <a:xfrm>
+            <a:off x="3249854" y="0"/>
+            <a:ext cx="5692292" cy="6858000"/>
+          </a:xfrm>
+          <a:prstGeom prst="rect">
+            <a:avLst/>
+          </a:prstGeom>
+        </p:spPr>
+      </p:pic>
+      <p:sp>
+        <p:nvSpPr>
+          <p:cNvPr id="4" name="Titre 3">
+            <a:extLst>
+              <a:ext uri="{FF2B5EF4-FFF2-40B4-BE49-F238E27FC236}">
+                <a16:creationId xmlns:a16="http://schemas.microsoft.com/office/drawing/2014/main" id="{FD5584B7-531A-7DD7-0287-7D504A7483F7}"/>
+              </a:ext>
+            </a:extLst>
+          </p:cNvPr>
+          <p:cNvSpPr>
+            <a:spLocks noGrp="1"/>
+          </p:cNvSpPr>
+          <p:nvPr>
+            <p:ph type="title"/>
+          </p:nvPr>
+        </p:nvSpPr>
+        <p:spPr>
+          <a:xfrm>
+            <a:off x="838200" y="365125"/>
+            <a:ext cx="10515600" cy="5749297"/>
+          </a:xfrm>
+          <a:effectLst>
+            <a:glow rad="127000">
+              <a:schemeClr val="tx1"/>
+            </a:glow>
+          </a:effectLst>
+        </p:spPr>
+        <p:txBody>
+          <a:bodyPr>
+            <a:normAutofit/>
+          </a:bodyPr>
+          <a:lstStyle/>
+          <a:p>
+            <a:pPr algn="ctr"/>
+            <a:r>
+              <a:rPr lang="fr-FR" sz="5400" b="1" dirty="0">
+                <a:solidFill>
+                  <a:srgbClr val="FF0000"/>
+                </a:solidFill>
+                <a:effectLst>
+                  <a:glow rad="127000">
+                    <a:schemeClr val="bg1"/>
+                  </a:glow>
+                </a:effectLst>
+              </a:rPr>
+              <a:t>Aimez-vous les protocoles sécurisés?</a:t>
+            </a:r>
+          </a:p>
+        </p:txBody>
+      </p:sp>
+    </p:spTree>
+    <p:extLst>
+      <p:ext uri="{BB962C8B-B14F-4D97-AF65-F5344CB8AC3E}">
+        <p14:creationId xmlns:p14="http://schemas.microsoft.com/office/powerpoint/2010/main" val="3022374063"/>
+      </p:ext>
+    </p:extLst>
+  </p:cSld>
+  <p:clrMapOvr>
+    <a:masterClrMapping/>
+  </p:clrMapOvr>
+</p:sld>
+</file>
+
+<file path=ppt/slides/slide5.xml><?xml version="1.0" encoding="utf-8"?>
+<p:sld xmlns:a="http://schemas.openxmlformats.org/drawingml/2006/main" xmlns:r="http://schemas.openxmlformats.org/officeDocument/2006/relationships" xmlns:p="http://schemas.openxmlformats.org/presentationml/2006/main">
+  <p:cSld>
+    <p:spTree>
+      <p:nvGrpSpPr>
+        <p:cNvPr id="1" name=""/>
+        <p:cNvGrpSpPr/>
+        <p:nvPr/>
+      </p:nvGrpSpPr>
+      <p:grpSpPr>
+        <a:xfrm>
+          <a:off x="0" y="0"/>
+          <a:ext cx="0" cy="0"/>
+          <a:chOff x="0" y="0"/>
+          <a:chExt cx="0" cy="0"/>
+        </a:xfrm>
+      </p:grpSpPr>
+      <p:pic>
+        <p:nvPicPr>
+          <p:cNvPr id="2" name="Image 1" descr="Une image contenant texte, éléments, plusieurs&#10;&#10;Description générée automatiquement">
+            <a:extLst>
+              <a:ext uri="{FF2B5EF4-FFF2-40B4-BE49-F238E27FC236}">
+                <a16:creationId xmlns:a16="http://schemas.microsoft.com/office/drawing/2014/main" id="{BBE5EC89-C26B-D46B-BC56-352E5D7458E9}"/>
+              </a:ext>
+            </a:extLst>
+          </p:cNvPr>
+          <p:cNvPicPr>
+            <a:picLocks noChangeAspect="1"/>
+          </p:cNvPicPr>
+          <p:nvPr/>
+        </p:nvPicPr>
+        <p:blipFill rotWithShape="1">
+          <a:blip r:embed="rId2"/>
+          <a:srcRect l="750" r="10346" b="1"/>
+          <a:stretch/>
+        </p:blipFill>
+        <p:spPr>
+          <a:xfrm>
+            <a:off x="20" y="1282"/>
+            <a:ext cx="12191980" cy="6856718"/>
+          </a:xfrm>
+          <a:prstGeom prst="rect">
+            <a:avLst/>
+          </a:prstGeom>
+        </p:spPr>
+      </p:pic>
+      <p:sp>
+        <p:nvSpPr>
+          <p:cNvPr id="4" name="Titre 3">
+            <a:extLst>
+              <a:ext uri="{FF2B5EF4-FFF2-40B4-BE49-F238E27FC236}">
+                <a16:creationId xmlns:a16="http://schemas.microsoft.com/office/drawing/2014/main" id="{FD5584B7-531A-7DD7-0287-7D504A7483F7}"/>
+              </a:ext>
+            </a:extLst>
+          </p:cNvPr>
+          <p:cNvSpPr>
+            <a:spLocks noGrp="1"/>
+          </p:cNvSpPr>
+          <p:nvPr>
+            <p:ph type="title"/>
+          </p:nvPr>
+        </p:nvSpPr>
+        <p:spPr>
+          <a:xfrm>
+            <a:off x="838200" y="365125"/>
+            <a:ext cx="10515600" cy="5749297"/>
+          </a:xfrm>
+          <a:effectLst>
+            <a:glow rad="127000">
+              <a:schemeClr val="tx1"/>
+            </a:glow>
+          </a:effectLst>
+        </p:spPr>
+        <p:txBody>
+          <a:bodyPr>
+            <a:normAutofit/>
+          </a:bodyPr>
+          <a:lstStyle/>
+          <a:p>
+            <a:pPr algn="ctr"/>
+            <a:r>
+              <a:rPr lang="fr-FR" sz="6600" b="1" dirty="0">
+                <a:solidFill>
+                  <a:srgbClr val="FF0000"/>
+                </a:solidFill>
+                <a:effectLst>
+                  <a:glow rad="127000">
+                    <a:schemeClr val="bg1"/>
+                  </a:glow>
+                </a:effectLst>
+              </a:rPr>
+              <a:t>Aimez-vous l’argent?</a:t>
+            </a:r>
+          </a:p>
+        </p:txBody>
+      </p:sp>
+    </p:spTree>
+    <p:extLst>
+      <p:ext uri="{BB962C8B-B14F-4D97-AF65-F5344CB8AC3E}">
+        <p14:creationId xmlns:p14="http://schemas.microsoft.com/office/powerpoint/2010/main" val="1489916450"/>
+      </p:ext>
+    </p:extLst>
+  </p:cSld>
+  <p:clrMapOvr>
+    <a:masterClrMapping/>
+  </p:clrMapOvr>
+</p:sld>
+</file>
+
+<file path=ppt/slides/slide6.xml><?xml version="1.0" encoding="utf-8"?>
+<p:sld xmlns:a="http://schemas.openxmlformats.org/drawingml/2006/main" xmlns:r="http://schemas.openxmlformats.org/officeDocument/2006/relationships" xmlns:p="http://schemas.openxmlformats.org/presentationml/2006/main">
+  <p:cSld>
+    <p:spTree>
+      <p:nvGrpSpPr>
+        <p:cNvPr id="1" name=""/>
+        <p:cNvGrpSpPr/>
+        <p:nvPr/>
+      </p:nvGrpSpPr>
+      <p:grpSpPr>
+        <a:xfrm>
+          <a:off x="0" y="0"/>
+          <a:ext cx="0" cy="0"/>
+          <a:chOff x="0" y="0"/>
+          <a:chExt cx="0" cy="0"/>
+        </a:xfrm>
+      </p:grpSpPr>
+      <p:pic>
+        <p:nvPicPr>
+          <p:cNvPr id="2" name="Image 1" descr="Une image contenant terrain, extérieur, colonnade&#10;&#10;Description générée automatiquement">
+            <a:extLst>
+              <a:ext uri="{FF2B5EF4-FFF2-40B4-BE49-F238E27FC236}">
+                <a16:creationId xmlns:a16="http://schemas.microsoft.com/office/drawing/2014/main" id="{F1556CA3-FEB4-069E-50E2-C5D681454BA7}"/>
+              </a:ext>
+            </a:extLst>
+          </p:cNvPr>
+          <p:cNvPicPr>
+            <a:picLocks noChangeAspect="1"/>
+          </p:cNvPicPr>
+          <p:nvPr/>
+        </p:nvPicPr>
+        <p:blipFill rotWithShape="1">
+          <a:blip r:embed="rId2"/>
+          <a:srcRect b="19"/>
+          <a:stretch/>
+        </p:blipFill>
+        <p:spPr>
+          <a:xfrm>
+            <a:off x="20" y="1282"/>
+            <a:ext cx="12191980" cy="6856718"/>
+          </a:xfrm>
+          <a:prstGeom prst="rect">
+            <a:avLst/>
+          </a:prstGeom>
+        </p:spPr>
+      </p:pic>
+      <p:sp>
+        <p:nvSpPr>
+          <p:cNvPr id="4" name="Titre 3">
+            <a:extLst>
+              <a:ext uri="{FF2B5EF4-FFF2-40B4-BE49-F238E27FC236}">
+                <a16:creationId xmlns:a16="http://schemas.microsoft.com/office/drawing/2014/main" id="{FD5584B7-531A-7DD7-0287-7D504A7483F7}"/>
+              </a:ext>
+            </a:extLst>
+          </p:cNvPr>
+          <p:cNvSpPr>
+            <a:spLocks noGrp="1"/>
+          </p:cNvSpPr>
+          <p:nvPr>
+            <p:ph type="title"/>
+          </p:nvPr>
+        </p:nvSpPr>
+        <p:spPr>
+          <a:xfrm>
+            <a:off x="838200" y="365125"/>
+            <a:ext cx="10515600" cy="5749297"/>
+          </a:xfrm>
+          <a:effectLst>
+            <a:glow rad="127000">
+              <a:schemeClr val="tx1"/>
+            </a:glow>
+          </a:effectLst>
+        </p:spPr>
+        <p:txBody>
+          <a:bodyPr>
+            <a:normAutofit/>
+          </a:bodyPr>
+          <a:lstStyle/>
+          <a:p>
+            <a:pPr algn="ctr"/>
+            <a:r>
+              <a:rPr lang="fr-FR" sz="6600" b="1" dirty="0">
+                <a:solidFill>
+                  <a:srgbClr val="FF0000"/>
+                </a:solidFill>
+                <a:effectLst>
+                  <a:glow rad="127000">
+                    <a:schemeClr val="bg1"/>
+                  </a:glow>
+                </a:effectLst>
+              </a:rPr>
+              <a:t>Aimez-vous Toulouse?</a:t>
+            </a:r>
+          </a:p>
+        </p:txBody>
+      </p:sp>
+    </p:spTree>
+    <p:extLst>
+      <p:ext uri="{BB962C8B-B14F-4D97-AF65-F5344CB8AC3E}">
+        <p14:creationId xmlns:p14="http://schemas.microsoft.com/office/powerpoint/2010/main" val="3221849862"/>
+      </p:ext>
+    </p:extLst>
+  </p:cSld>
+  <p:clrMapOvr>
+    <a:masterClrMapping/>
+  </p:clrMapOvr>
+</p:sld>
+</file>
+
 <file path=ppt/theme/theme1.xml><?xml version="1.0" encoding="utf-8"?>
 <a:theme xmlns:a="http://schemas.openxmlformats.org/drawingml/2006/main" name="Thème Office">
   <a:themeElements>

</xml_diff>

<commit_message>
added presentation overview (with (lots) of animations)
</commit_message>
<xml_diff>
--- a/slides.pptx
+++ b/slides.pptx
@@ -6,11 +6,13 @@
   </p:sldMasterIdLst>
   <p:sldIdLst>
     <p:sldId id="256" r:id="rId2"/>
-    <p:sldId id="267" r:id="rId3"/>
-    <p:sldId id="257" r:id="rId4"/>
-    <p:sldId id="261" r:id="rId5"/>
-    <p:sldId id="262" r:id="rId6"/>
-    <p:sldId id="263" r:id="rId7"/>
+    <p:sldId id="257" r:id="rId3"/>
+    <p:sldId id="261" r:id="rId4"/>
+    <p:sldId id="262" r:id="rId5"/>
+    <p:sldId id="263" r:id="rId6"/>
+    <p:sldId id="274" r:id="rId7"/>
+    <p:sldId id="297" r:id="rId8"/>
+    <p:sldId id="299" r:id="rId9"/>
   </p:sldIdLst>
   <p:sldSz cx="12192000" cy="6858000"/>
   <p:notesSz cx="6858000" cy="9144000"/>
@@ -264,7 +266,7 @@
           <a:p>
             <a:fld id="{1F9E4FA3-09EB-420E-8B8D-1F38C173CA1D}" type="datetimeFigureOut">
               <a:rPr lang="fr-FR" smtClean="0"/>
-              <a:t>14/09/2022</a:t>
+              <a:t>15/09/2022</a:t>
             </a:fld>
             <a:endParaRPr lang="fr-FR"/>
           </a:p>
@@ -462,7 +464,7 @@
           <a:p>
             <a:fld id="{1F9E4FA3-09EB-420E-8B8D-1F38C173CA1D}" type="datetimeFigureOut">
               <a:rPr lang="fr-FR" smtClean="0"/>
-              <a:t>14/09/2022</a:t>
+              <a:t>15/09/2022</a:t>
             </a:fld>
             <a:endParaRPr lang="fr-FR"/>
           </a:p>
@@ -670,7 +672,7 @@
           <a:p>
             <a:fld id="{1F9E4FA3-09EB-420E-8B8D-1F38C173CA1D}" type="datetimeFigureOut">
               <a:rPr lang="fr-FR" smtClean="0"/>
-              <a:t>14/09/2022</a:t>
+              <a:t>15/09/2022</a:t>
             </a:fld>
             <a:endParaRPr lang="fr-FR"/>
           </a:p>
@@ -868,7 +870,7 @@
           <a:p>
             <a:fld id="{1F9E4FA3-09EB-420E-8B8D-1F38C173CA1D}" type="datetimeFigureOut">
               <a:rPr lang="fr-FR" smtClean="0"/>
-              <a:t>14/09/2022</a:t>
+              <a:t>15/09/2022</a:t>
             </a:fld>
             <a:endParaRPr lang="fr-FR"/>
           </a:p>
@@ -1143,7 +1145,7 @@
           <a:p>
             <a:fld id="{1F9E4FA3-09EB-420E-8B8D-1F38C173CA1D}" type="datetimeFigureOut">
               <a:rPr lang="fr-FR" smtClean="0"/>
-              <a:t>14/09/2022</a:t>
+              <a:t>15/09/2022</a:t>
             </a:fld>
             <a:endParaRPr lang="fr-FR"/>
           </a:p>
@@ -1408,7 +1410,7 @@
           <a:p>
             <a:fld id="{1F9E4FA3-09EB-420E-8B8D-1F38C173CA1D}" type="datetimeFigureOut">
               <a:rPr lang="fr-FR" smtClean="0"/>
-              <a:t>14/09/2022</a:t>
+              <a:t>15/09/2022</a:t>
             </a:fld>
             <a:endParaRPr lang="fr-FR"/>
           </a:p>
@@ -1820,7 +1822,7 @@
           <a:p>
             <a:fld id="{1F9E4FA3-09EB-420E-8B8D-1F38C173CA1D}" type="datetimeFigureOut">
               <a:rPr lang="fr-FR" smtClean="0"/>
-              <a:t>14/09/2022</a:t>
+              <a:t>15/09/2022</a:t>
             </a:fld>
             <a:endParaRPr lang="fr-FR"/>
           </a:p>
@@ -1961,7 +1963,7 @@
           <a:p>
             <a:fld id="{1F9E4FA3-09EB-420E-8B8D-1F38C173CA1D}" type="datetimeFigureOut">
               <a:rPr lang="fr-FR" smtClean="0"/>
-              <a:t>14/09/2022</a:t>
+              <a:t>15/09/2022</a:t>
             </a:fld>
             <a:endParaRPr lang="fr-FR"/>
           </a:p>
@@ -2074,7 +2076,7 @@
           <a:p>
             <a:fld id="{1F9E4FA3-09EB-420E-8B8D-1F38C173CA1D}" type="datetimeFigureOut">
               <a:rPr lang="fr-FR" smtClean="0"/>
-              <a:t>14/09/2022</a:t>
+              <a:t>15/09/2022</a:t>
             </a:fld>
             <a:endParaRPr lang="fr-FR"/>
           </a:p>
@@ -2385,7 +2387,7 @@
           <a:p>
             <a:fld id="{1F9E4FA3-09EB-420E-8B8D-1F38C173CA1D}" type="datetimeFigureOut">
               <a:rPr lang="fr-FR" smtClean="0"/>
-              <a:t>14/09/2022</a:t>
+              <a:t>15/09/2022</a:t>
             </a:fld>
             <a:endParaRPr lang="fr-FR"/>
           </a:p>
@@ -2673,7 +2675,7 @@
           <a:p>
             <a:fld id="{1F9E4FA3-09EB-420E-8B8D-1F38C173CA1D}" type="datetimeFigureOut">
               <a:rPr lang="fr-FR" smtClean="0"/>
-              <a:t>14/09/2022</a:t>
+              <a:t>15/09/2022</a:t>
             </a:fld>
             <a:endParaRPr lang="fr-FR"/>
           </a:p>
@@ -2914,7 +2916,7 @@
           <a:p>
             <a:fld id="{1F9E4FA3-09EB-420E-8B8D-1F38C173CA1D}" type="datetimeFigureOut">
               <a:rPr lang="fr-FR" smtClean="0"/>
-              <a:t>14/09/2022</a:t>
+              <a:t>15/09/2022</a:t>
             </a:fld>
             <a:endParaRPr lang="fr-FR"/>
           </a:p>
@@ -3462,103 +3464,6 @@
           <a:chExt cx="0" cy="0"/>
         </a:xfrm>
       </p:grpSpPr>
-      <p:sp>
-        <p:nvSpPr>
-          <p:cNvPr id="4" name="Titre 3">
-            <a:extLst>
-              <a:ext uri="{FF2B5EF4-FFF2-40B4-BE49-F238E27FC236}">
-                <a16:creationId xmlns:a16="http://schemas.microsoft.com/office/drawing/2014/main" id="{1D76D3CE-724C-57F7-99AE-B07727C73835}"/>
-              </a:ext>
-            </a:extLst>
-          </p:cNvPr>
-          <p:cNvSpPr>
-            <a:spLocks noGrp="1"/>
-          </p:cNvSpPr>
-          <p:nvPr>
-            <p:ph type="title"/>
-          </p:nvPr>
-        </p:nvSpPr>
-        <p:spPr/>
-        <p:txBody>
-          <a:bodyPr/>
-          <a:lstStyle/>
-          <a:p>
-            <a:pPr algn="ctr"/>
-            <a:r>
-              <a:rPr lang="fr-FR" b="1" dirty="0"/>
-              <a:t>Ou comment faire passer un secret avec un haut parleur…</a:t>
-            </a:r>
-          </a:p>
-        </p:txBody>
-      </p:sp>
-      <p:pic>
-        <p:nvPicPr>
-          <p:cNvPr id="7" name="Espace réservé du contenu 6">
-            <a:extLst>
-              <a:ext uri="{FF2B5EF4-FFF2-40B4-BE49-F238E27FC236}">
-                <a16:creationId xmlns:a16="http://schemas.microsoft.com/office/drawing/2014/main" id="{2E6AE29E-E2D6-1A14-3083-559229F4A444}"/>
-              </a:ext>
-            </a:extLst>
-          </p:cNvPr>
-          <p:cNvPicPr>
-            <a:picLocks noGrp="1" noChangeAspect="1"/>
-          </p:cNvPicPr>
-          <p:nvPr>
-            <p:ph idx="1"/>
-          </p:nvPr>
-        </p:nvPicPr>
-        <p:blipFill>
-          <a:blip r:embed="rId2">
-            <a:extLst>
-              <a:ext uri="{28A0092B-C50C-407E-A947-70E740481C1C}">
-                <a14:useLocalDpi xmlns:a14="http://schemas.microsoft.com/office/drawing/2010/main" val="0"/>
-              </a:ext>
-              <a:ext uri="{96DAC541-7B7A-43D3-8B79-37D633B846F1}">
-                <asvg:svgBlip xmlns:asvg="http://schemas.microsoft.com/office/drawing/2016/SVG/main" r:embed="rId3"/>
-              </a:ext>
-            </a:extLst>
-          </a:blip>
-          <a:stretch>
-            <a:fillRect/>
-          </a:stretch>
-        </p:blipFill>
-        <p:spPr>
-          <a:xfrm>
-            <a:off x="3195108" y="1850746"/>
-            <a:ext cx="5801784" cy="4351338"/>
-          </a:xfrm>
-        </p:spPr>
-      </p:pic>
-    </p:spTree>
-    <p:extLst>
-      <p:ext uri="{BB962C8B-B14F-4D97-AF65-F5344CB8AC3E}">
-        <p14:creationId xmlns:p14="http://schemas.microsoft.com/office/powerpoint/2010/main" val="2249693919"/>
-      </p:ext>
-    </p:extLst>
-  </p:cSld>
-  <p:clrMapOvr>
-    <a:masterClrMapping/>
-  </p:clrMapOvr>
-</p:sld>
-</file>
-
-<file path=ppt/slides/slide3.xml><?xml version="1.0" encoding="utf-8"?>
-<p:sld xmlns:a="http://schemas.openxmlformats.org/drawingml/2006/main" xmlns:r="http://schemas.openxmlformats.org/officeDocument/2006/relationships" xmlns:p="http://schemas.openxmlformats.org/presentationml/2006/main">
-  <p:cSld>
-    <p:spTree>
-      <p:nvGrpSpPr>
-        <p:cNvPr id="1" name=""/>
-        <p:cNvGrpSpPr/>
-        <p:nvPr/>
-      </p:nvGrpSpPr>
-      <p:grpSpPr>
-        <a:xfrm>
-          <a:off x="0" y="0"/>
-          <a:ext cx="0" cy="0"/>
-          <a:chOff x="0" y="0"/>
-          <a:chExt cx="0" cy="0"/>
-        </a:xfrm>
-      </p:grpSpPr>
       <p:pic>
         <p:nvPicPr>
           <p:cNvPr id="3" name="Image 2">
@@ -3651,7 +3556,7 @@
 </p:sld>
 </file>
 
-<file path=ppt/slides/slide4.xml><?xml version="1.0" encoding="utf-8"?>
+<file path=ppt/slides/slide3.xml><?xml version="1.0" encoding="utf-8"?>
 <p:sld xmlns:a="http://schemas.openxmlformats.org/drawingml/2006/main" xmlns:r="http://schemas.openxmlformats.org/officeDocument/2006/relationships" xmlns:p="http://schemas.openxmlformats.org/presentationml/2006/main">
   <p:cSld>
     <p:spTree>
@@ -3810,7 +3715,7 @@
 </p:sld>
 </file>
 
-<file path=ppt/slides/slide5.xml><?xml version="1.0" encoding="utf-8"?>
+<file path=ppt/slides/slide4.xml><?xml version="1.0" encoding="utf-8"?>
 <p:sld xmlns:a="http://schemas.openxmlformats.org/drawingml/2006/main" xmlns:r="http://schemas.openxmlformats.org/officeDocument/2006/relationships" xmlns:p="http://schemas.openxmlformats.org/presentationml/2006/main">
   <p:cSld>
     <p:spTree>
@@ -3910,6 +3815,115 @@
     <p:extLst>
       <p:ext uri="{BB962C8B-B14F-4D97-AF65-F5344CB8AC3E}">
         <p14:creationId xmlns:p14="http://schemas.microsoft.com/office/powerpoint/2010/main" val="1489916450"/>
+      </p:ext>
+    </p:extLst>
+  </p:cSld>
+  <p:clrMapOvr>
+    <a:masterClrMapping/>
+  </p:clrMapOvr>
+</p:sld>
+</file>
+
+<file path=ppt/slides/slide5.xml><?xml version="1.0" encoding="utf-8"?>
+<p:sld xmlns:a="http://schemas.openxmlformats.org/drawingml/2006/main" xmlns:r="http://schemas.openxmlformats.org/officeDocument/2006/relationships" xmlns:p="http://schemas.openxmlformats.org/presentationml/2006/main">
+  <p:cSld>
+    <p:spTree>
+      <p:nvGrpSpPr>
+        <p:cNvPr id="1" name=""/>
+        <p:cNvGrpSpPr/>
+        <p:nvPr/>
+      </p:nvGrpSpPr>
+      <p:grpSpPr>
+        <a:xfrm>
+          <a:off x="0" y="0"/>
+          <a:ext cx="0" cy="0"/>
+          <a:chOff x="0" y="0"/>
+          <a:chExt cx="0" cy="0"/>
+        </a:xfrm>
+      </p:grpSpPr>
+      <p:pic>
+        <p:nvPicPr>
+          <p:cNvPr id="2" name="Image 1" descr="Une image contenant terrain, extérieur, colonnade&#10;&#10;Description générée automatiquement">
+            <a:extLst>
+              <a:ext uri="{FF2B5EF4-FFF2-40B4-BE49-F238E27FC236}">
+                <a16:creationId xmlns:a16="http://schemas.microsoft.com/office/drawing/2014/main" id="{F1556CA3-FEB4-069E-50E2-C5D681454BA7}"/>
+              </a:ext>
+            </a:extLst>
+          </p:cNvPr>
+          <p:cNvPicPr>
+            <a:picLocks noChangeAspect="1"/>
+          </p:cNvPicPr>
+          <p:nvPr/>
+        </p:nvPicPr>
+        <p:blipFill rotWithShape="1">
+          <a:blip r:embed="rId2"/>
+          <a:srcRect b="19"/>
+          <a:stretch/>
+        </p:blipFill>
+        <p:spPr>
+          <a:xfrm>
+            <a:off x="20" y="1282"/>
+            <a:ext cx="12191980" cy="6856718"/>
+          </a:xfrm>
+          <a:prstGeom prst="rect">
+            <a:avLst/>
+          </a:prstGeom>
+        </p:spPr>
+      </p:pic>
+      <p:sp>
+        <p:nvSpPr>
+          <p:cNvPr id="4" name="Titre 3">
+            <a:extLst>
+              <a:ext uri="{FF2B5EF4-FFF2-40B4-BE49-F238E27FC236}">
+                <a16:creationId xmlns:a16="http://schemas.microsoft.com/office/drawing/2014/main" id="{FD5584B7-531A-7DD7-0287-7D504A7483F7}"/>
+              </a:ext>
+            </a:extLst>
+          </p:cNvPr>
+          <p:cNvSpPr>
+            <a:spLocks noGrp="1"/>
+          </p:cNvSpPr>
+          <p:nvPr>
+            <p:ph type="title"/>
+          </p:nvPr>
+        </p:nvSpPr>
+        <p:spPr>
+          <a:xfrm>
+            <a:off x="838200" y="365125"/>
+            <a:ext cx="10515600" cy="5749297"/>
+          </a:xfrm>
+          <a:effectLst>
+            <a:glow rad="127000">
+              <a:schemeClr val="tx1"/>
+            </a:glow>
+          </a:effectLst>
+        </p:spPr>
+        <p:txBody>
+          <a:bodyPr>
+            <a:normAutofit/>
+          </a:bodyPr>
+          <a:lstStyle/>
+          <a:p>
+            <a:pPr algn="ctr"/>
+            <a:r>
+              <a:rPr lang="fr-FR" sz="6600" b="1" dirty="0">
+                <a:solidFill>
+                  <a:srgbClr val="FF0000"/>
+                </a:solidFill>
+                <a:effectLst>
+                  <a:glow rad="127000">
+                    <a:schemeClr val="bg1"/>
+                  </a:glow>
+                </a:effectLst>
+              </a:rPr>
+              <a:t>Aimez-vous Toulouse?</a:t>
+            </a:r>
+          </a:p>
+        </p:txBody>
+      </p:sp>
+    </p:spTree>
+    <p:extLst>
+      <p:ext uri="{BB962C8B-B14F-4D97-AF65-F5344CB8AC3E}">
+        <p14:creationId xmlns:p14="http://schemas.microsoft.com/office/powerpoint/2010/main" val="3221849862"/>
       </p:ext>
     </p:extLst>
   </p:cSld>
@@ -3936,12 +3950,723 @@
           <a:chExt cx="0" cy="0"/>
         </a:xfrm>
       </p:grpSpPr>
+      <p:sp>
+        <p:nvSpPr>
+          <p:cNvPr id="4" name="Titre 3">
+            <a:extLst>
+              <a:ext uri="{FF2B5EF4-FFF2-40B4-BE49-F238E27FC236}">
+                <a16:creationId xmlns:a16="http://schemas.microsoft.com/office/drawing/2014/main" id="{1D76D3CE-724C-57F7-99AE-B07727C73835}"/>
+              </a:ext>
+            </a:extLst>
+          </p:cNvPr>
+          <p:cNvSpPr>
+            <a:spLocks noGrp="1"/>
+          </p:cNvSpPr>
+          <p:nvPr>
+            <p:ph type="title"/>
+          </p:nvPr>
+        </p:nvSpPr>
+        <p:spPr/>
+        <p:txBody>
+          <a:bodyPr/>
+          <a:lstStyle/>
+          <a:p>
+            <a:pPr algn="ctr"/>
+            <a:r>
+              <a:rPr lang="fr-FR" b="1" dirty="0"/>
+              <a:t>Comment faire passer un message secret…</a:t>
+            </a:r>
+            <a:br>
+              <a:rPr lang="fr-FR" b="1" dirty="0"/>
+            </a:br>
+            <a:r>
+              <a:rPr lang="fr-FR" b="1" dirty="0"/>
+              <a:t>… avec un haut-parleur?</a:t>
+            </a:r>
+          </a:p>
+        </p:txBody>
+      </p:sp>
       <p:pic>
         <p:nvPicPr>
-          <p:cNvPr id="2" name="Image 1" descr="Une image contenant terrain, extérieur, colonnade&#10;&#10;Description générée automatiquement">
-            <a:extLst>
-              <a:ext uri="{FF2B5EF4-FFF2-40B4-BE49-F238E27FC236}">
-                <a16:creationId xmlns:a16="http://schemas.microsoft.com/office/drawing/2014/main" id="{F1556CA3-FEB4-069E-50E2-C5D681454BA7}"/>
+          <p:cNvPr id="7" name="Espace réservé du contenu 6">
+            <a:extLst>
+              <a:ext uri="{FF2B5EF4-FFF2-40B4-BE49-F238E27FC236}">
+                <a16:creationId xmlns:a16="http://schemas.microsoft.com/office/drawing/2014/main" id="{2E6AE29E-E2D6-1A14-3083-559229F4A444}"/>
+              </a:ext>
+            </a:extLst>
+          </p:cNvPr>
+          <p:cNvPicPr>
+            <a:picLocks noGrp="1" noChangeAspect="1"/>
+          </p:cNvPicPr>
+          <p:nvPr>
+            <p:ph idx="1"/>
+          </p:nvPr>
+        </p:nvPicPr>
+        <p:blipFill>
+          <a:blip r:embed="rId2">
+            <a:extLst>
+              <a:ext uri="{28A0092B-C50C-407E-A947-70E740481C1C}">
+                <a14:useLocalDpi xmlns:a14="http://schemas.microsoft.com/office/drawing/2010/main" val="0"/>
+              </a:ext>
+              <a:ext uri="{96DAC541-7B7A-43D3-8B79-37D633B846F1}">
+                <asvg:svgBlip xmlns:asvg="http://schemas.microsoft.com/office/drawing/2016/SVG/main" r:embed="rId3"/>
+              </a:ext>
+            </a:extLst>
+          </a:blip>
+          <a:stretch>
+            <a:fillRect/>
+          </a:stretch>
+        </p:blipFill>
+        <p:spPr>
+          <a:xfrm>
+            <a:off x="3195108" y="1850746"/>
+            <a:ext cx="5801784" cy="4351338"/>
+          </a:xfrm>
+        </p:spPr>
+      </p:pic>
+    </p:spTree>
+    <p:extLst>
+      <p:ext uri="{BB962C8B-B14F-4D97-AF65-F5344CB8AC3E}">
+        <p14:creationId xmlns:p14="http://schemas.microsoft.com/office/powerpoint/2010/main" val="2061001290"/>
+      </p:ext>
+    </p:extLst>
+  </p:cSld>
+  <p:clrMapOvr>
+    <a:masterClrMapping/>
+  </p:clrMapOvr>
+</p:sld>
+</file>
+
+<file path=ppt/slides/slide7.xml><?xml version="1.0" encoding="utf-8"?>
+<p:sld xmlns:a="http://schemas.openxmlformats.org/drawingml/2006/main" xmlns:r="http://schemas.openxmlformats.org/officeDocument/2006/relationships" xmlns:p="http://schemas.openxmlformats.org/presentationml/2006/main">
+  <p:cSld>
+    <p:spTree>
+      <p:nvGrpSpPr>
+        <p:cNvPr id="1" name=""/>
+        <p:cNvGrpSpPr/>
+        <p:nvPr/>
+      </p:nvGrpSpPr>
+      <p:grpSpPr>
+        <a:xfrm>
+          <a:off x="0" y="0"/>
+          <a:ext cx="0" cy="0"/>
+          <a:chOff x="0" y="0"/>
+          <a:chExt cx="0" cy="0"/>
+        </a:xfrm>
+      </p:grpSpPr>
+      <p:sp>
+        <p:nvSpPr>
+          <p:cNvPr id="3" name="Trapèze 2">
+            <a:extLst>
+              <a:ext uri="{FF2B5EF4-FFF2-40B4-BE49-F238E27FC236}">
+                <a16:creationId xmlns:a16="http://schemas.microsoft.com/office/drawing/2014/main" id="{5279F188-C7CC-8789-8EF9-BE8CA6B1F339}"/>
+              </a:ext>
+            </a:extLst>
+          </p:cNvPr>
+          <p:cNvSpPr/>
+          <p:nvPr/>
+        </p:nvSpPr>
+        <p:spPr>
+          <a:xfrm>
+            <a:off x="1744593" y="2674764"/>
+            <a:ext cx="4505736" cy="1531620"/>
+          </a:xfrm>
+          <a:prstGeom prst="trapezoid">
+            <a:avLst>
+              <a:gd name="adj" fmla="val 57756"/>
+            </a:avLst>
+          </a:prstGeom>
+          <a:solidFill>
+            <a:schemeClr val="tx1"/>
+          </a:solidFill>
+          <a:ln w="76200">
+            <a:solidFill>
+              <a:schemeClr val="tx1"/>
+            </a:solidFill>
+          </a:ln>
+        </p:spPr>
+        <p:style>
+          <a:lnRef idx="2">
+            <a:schemeClr val="accent1">
+              <a:shade val="50000"/>
+            </a:schemeClr>
+          </a:lnRef>
+          <a:fillRef idx="1">
+            <a:schemeClr val="accent1"/>
+          </a:fillRef>
+          <a:effectRef idx="0">
+            <a:schemeClr val="accent1"/>
+          </a:effectRef>
+          <a:fontRef idx="minor">
+            <a:schemeClr val="lt1"/>
+          </a:fontRef>
+        </p:style>
+        <p:txBody>
+          <a:bodyPr rtlCol="0" anchor="ctr"/>
+          <a:lstStyle/>
+          <a:p>
+            <a:pPr algn="ctr"/>
+            <a:endParaRPr lang="fr-FR"/>
+          </a:p>
+        </p:txBody>
+      </p:sp>
+      <p:sp>
+        <p:nvSpPr>
+          <p:cNvPr id="4" name="Trapèze 3">
+            <a:extLst>
+              <a:ext uri="{FF2B5EF4-FFF2-40B4-BE49-F238E27FC236}">
+                <a16:creationId xmlns:a16="http://schemas.microsoft.com/office/drawing/2014/main" id="{B4A07FF5-11EB-E190-0DE5-B1E31581128E}"/>
+              </a:ext>
+            </a:extLst>
+          </p:cNvPr>
+          <p:cNvSpPr/>
+          <p:nvPr/>
+        </p:nvSpPr>
+        <p:spPr>
+          <a:xfrm>
+            <a:off x="441960" y="4695056"/>
+            <a:ext cx="7101840" cy="1733550"/>
+          </a:xfrm>
+          <a:prstGeom prst="trapezoid">
+            <a:avLst>
+              <a:gd name="adj" fmla="val 58626"/>
+            </a:avLst>
+          </a:prstGeom>
+          <a:solidFill>
+            <a:schemeClr val="tx1"/>
+          </a:solidFill>
+          <a:ln w="76200">
+            <a:solidFill>
+              <a:schemeClr val="tx1"/>
+            </a:solidFill>
+          </a:ln>
+        </p:spPr>
+        <p:style>
+          <a:lnRef idx="2">
+            <a:schemeClr val="accent1">
+              <a:shade val="50000"/>
+            </a:schemeClr>
+          </a:lnRef>
+          <a:fillRef idx="1">
+            <a:schemeClr val="accent1"/>
+          </a:fillRef>
+          <a:effectRef idx="0">
+            <a:schemeClr val="accent1"/>
+          </a:effectRef>
+          <a:fontRef idx="minor">
+            <a:schemeClr val="lt1"/>
+          </a:fontRef>
+        </p:style>
+        <p:txBody>
+          <a:bodyPr rtlCol="0" anchor="ctr"/>
+          <a:lstStyle/>
+          <a:p>
+            <a:pPr algn="ctr"/>
+            <a:endParaRPr lang="fr-FR"/>
+          </a:p>
+        </p:txBody>
+      </p:sp>
+      <p:sp>
+        <p:nvSpPr>
+          <p:cNvPr id="5" name="Triangle isocèle 4">
+            <a:extLst>
+              <a:ext uri="{FF2B5EF4-FFF2-40B4-BE49-F238E27FC236}">
+                <a16:creationId xmlns:a16="http://schemas.microsoft.com/office/drawing/2014/main" id="{72AF7891-C9E8-AB5D-E078-645D3666D636}"/>
+              </a:ext>
+            </a:extLst>
+          </p:cNvPr>
+          <p:cNvSpPr/>
+          <p:nvPr/>
+        </p:nvSpPr>
+        <p:spPr>
+          <a:xfrm>
+            <a:off x="2911033" y="312516"/>
+            <a:ext cx="2176040" cy="1873576"/>
+          </a:xfrm>
+          <a:prstGeom prst="triangle">
+            <a:avLst/>
+          </a:prstGeom>
+          <a:solidFill>
+            <a:schemeClr val="tx1"/>
+          </a:solidFill>
+          <a:ln w="76200">
+            <a:solidFill>
+              <a:schemeClr val="tx1"/>
+            </a:solidFill>
+          </a:ln>
+        </p:spPr>
+        <p:style>
+          <a:lnRef idx="2">
+            <a:schemeClr val="accent1">
+              <a:shade val="50000"/>
+            </a:schemeClr>
+          </a:lnRef>
+          <a:fillRef idx="1">
+            <a:schemeClr val="accent1"/>
+          </a:fillRef>
+          <a:effectRef idx="0">
+            <a:schemeClr val="accent1"/>
+          </a:effectRef>
+          <a:fontRef idx="minor">
+            <a:schemeClr val="lt1"/>
+          </a:fontRef>
+        </p:style>
+        <p:txBody>
+          <a:bodyPr rtlCol="0" anchor="ctr"/>
+          <a:lstStyle/>
+          <a:p>
+            <a:pPr algn="ctr"/>
+            <a:endParaRPr lang="fr-FR"/>
+          </a:p>
+        </p:txBody>
+      </p:sp>
+      <p:sp>
+        <p:nvSpPr>
+          <p:cNvPr id="6" name="ZoneTexte 5">
+            <a:extLst>
+              <a:ext uri="{FF2B5EF4-FFF2-40B4-BE49-F238E27FC236}">
+                <a16:creationId xmlns:a16="http://schemas.microsoft.com/office/drawing/2014/main" id="{057C371A-96DA-F938-D01C-473E0CDFBA90}"/>
+              </a:ext>
+            </a:extLst>
+          </p:cNvPr>
+          <p:cNvSpPr txBox="1"/>
+          <p:nvPr/>
+        </p:nvSpPr>
+        <p:spPr>
+          <a:xfrm>
+            <a:off x="3704474" y="869492"/>
+            <a:ext cx="2939266" cy="1107996"/>
+          </a:xfrm>
+          <a:prstGeom prst="rect">
+            <a:avLst/>
+          </a:prstGeom>
+          <a:noFill/>
+        </p:spPr>
+        <p:txBody>
+          <a:bodyPr wrap="none" rtlCol="0">
+            <a:spAutoFit/>
+          </a:bodyPr>
+          <a:lstStyle/>
+          <a:p>
+            <a:r>
+              <a:rPr lang="fr-FR" sz="6600" b="1" dirty="0">
+                <a:solidFill>
+                  <a:schemeClr val="tx1">
+                    <a:lumMod val="50000"/>
+                    <a:lumOff val="50000"/>
+                  </a:schemeClr>
+                </a:solidFill>
+              </a:rPr>
+              <a:t>3     RSA</a:t>
+            </a:r>
+            <a:endParaRPr lang="fr-FR" sz="2400" b="1" dirty="0">
+              <a:solidFill>
+                <a:schemeClr val="tx1">
+                  <a:lumMod val="50000"/>
+                  <a:lumOff val="50000"/>
+                </a:schemeClr>
+              </a:solidFill>
+            </a:endParaRPr>
+          </a:p>
+        </p:txBody>
+      </p:sp>
+      <p:sp>
+        <p:nvSpPr>
+          <p:cNvPr id="7" name="ZoneTexte 6">
+            <a:extLst>
+              <a:ext uri="{FF2B5EF4-FFF2-40B4-BE49-F238E27FC236}">
+                <a16:creationId xmlns:a16="http://schemas.microsoft.com/office/drawing/2014/main" id="{9B33EFEE-D617-357A-1FB5-5EBC075685E6}"/>
+              </a:ext>
+            </a:extLst>
+          </p:cNvPr>
+          <p:cNvSpPr txBox="1"/>
+          <p:nvPr/>
+        </p:nvSpPr>
+        <p:spPr>
+          <a:xfrm>
+            <a:off x="3704474" y="2831269"/>
+            <a:ext cx="6075317" cy="1107996"/>
+          </a:xfrm>
+          <a:prstGeom prst="rect">
+            <a:avLst/>
+          </a:prstGeom>
+          <a:noFill/>
+        </p:spPr>
+        <p:txBody>
+          <a:bodyPr wrap="none" rtlCol="0">
+            <a:spAutoFit/>
+          </a:bodyPr>
+          <a:lstStyle/>
+          <a:p>
+            <a:r>
+              <a:rPr lang="fr-FR" sz="6600" b="1" dirty="0">
+                <a:solidFill>
+                  <a:schemeClr val="tx1">
+                    <a:lumMod val="50000"/>
+                    <a:lumOff val="50000"/>
+                  </a:schemeClr>
+                </a:solidFill>
+              </a:rPr>
+              <a:t>2           Encodage</a:t>
+            </a:r>
+            <a:endParaRPr lang="fr-FR" sz="3600" b="1" dirty="0">
+              <a:solidFill>
+                <a:schemeClr val="tx1">
+                  <a:lumMod val="50000"/>
+                  <a:lumOff val="50000"/>
+                </a:schemeClr>
+              </a:solidFill>
+            </a:endParaRPr>
+          </a:p>
+        </p:txBody>
+      </p:sp>
+      <p:sp>
+        <p:nvSpPr>
+          <p:cNvPr id="10" name="ZoneTexte 9">
+            <a:extLst>
+              <a:ext uri="{FF2B5EF4-FFF2-40B4-BE49-F238E27FC236}">
+                <a16:creationId xmlns:a16="http://schemas.microsoft.com/office/drawing/2014/main" id="{3E66E88B-51DB-035C-8FF7-866ACB4E8F74}"/>
+              </a:ext>
+            </a:extLst>
+          </p:cNvPr>
+          <p:cNvSpPr txBox="1"/>
+          <p:nvPr/>
+        </p:nvSpPr>
+        <p:spPr>
+          <a:xfrm>
+            <a:off x="3704474" y="5007833"/>
+            <a:ext cx="8119530" cy="1107996"/>
+          </a:xfrm>
+          <a:prstGeom prst="rect">
+            <a:avLst/>
+          </a:prstGeom>
+          <a:noFill/>
+        </p:spPr>
+        <p:txBody>
+          <a:bodyPr wrap="none" rtlCol="0">
+            <a:spAutoFit/>
+          </a:bodyPr>
+          <a:lstStyle/>
+          <a:p>
+            <a:r>
+              <a:rPr lang="fr-FR" sz="6600" b="1" dirty="0">
+                <a:solidFill>
+                  <a:schemeClr val="tx1">
+                    <a:lumMod val="50000"/>
+                    <a:lumOff val="50000"/>
+                  </a:schemeClr>
+                </a:solidFill>
+              </a:rPr>
+              <a:t>1                  Alice &amp; Bob</a:t>
+            </a:r>
+          </a:p>
+        </p:txBody>
+      </p:sp>
+    </p:spTree>
+    <p:extLst>
+      <p:ext uri="{BB962C8B-B14F-4D97-AF65-F5344CB8AC3E}">
+        <p14:creationId xmlns:p14="http://schemas.microsoft.com/office/powerpoint/2010/main" val="1674414837"/>
+      </p:ext>
+    </p:extLst>
+  </p:cSld>
+  <p:clrMapOvr>
+    <a:masterClrMapping/>
+  </p:clrMapOvr>
+  <p:timing>
+    <p:tnLst>
+      <p:par>
+        <p:cTn id="1" dur="indefinite" restart="never" nodeType="tmRoot">
+          <p:childTnLst>
+            <p:seq concurrent="1" nextAc="seek">
+              <p:cTn id="2" dur="indefinite" nodeType="mainSeq">
+                <p:childTnLst>
+                  <p:par>
+                    <p:cTn id="3" fill="hold">
+                      <p:stCondLst>
+                        <p:cond delay="indefinite"/>
+                      </p:stCondLst>
+                      <p:childTnLst>
+                        <p:par>
+                          <p:cTn id="4" fill="hold">
+                            <p:stCondLst>
+                              <p:cond delay="0"/>
+                            </p:stCondLst>
+                            <p:childTnLst>
+                              <p:par>
+                                <p:cTn id="5" presetID="7" presetClass="emph" presetSubtype="2" fill="hold" nodeType="clickEffect">
+                                  <p:stCondLst>
+                                    <p:cond delay="0"/>
+                                  </p:stCondLst>
+                                  <p:childTnLst>
+                                    <p:animClr clrSpc="rgb" dir="cw">
+                                      <p:cBhvr>
+                                        <p:cTn id="6" dur="500" fill="hold"/>
+                                        <p:tgtEl>
+                                          <p:spTgt spid="4"/>
+                                        </p:tgtEl>
+                                        <p:attrNameLst>
+                                          <p:attrName>stroke.color</p:attrName>
+                                        </p:attrNameLst>
+                                      </p:cBhvr>
+                                      <p:to>
+                                        <a:srgbClr val="92D050"/>
+                                      </p:to>
+                                    </p:animClr>
+                                    <p:set>
+                                      <p:cBhvr>
+                                        <p:cTn id="7" dur="500" fill="hold"/>
+                                        <p:tgtEl>
+                                          <p:spTgt spid="4"/>
+                                        </p:tgtEl>
+                                        <p:attrNameLst>
+                                          <p:attrName>stroke.on</p:attrName>
+                                        </p:attrNameLst>
+                                      </p:cBhvr>
+                                      <p:to>
+                                        <p:strVal val="true"/>
+                                      </p:to>
+                                    </p:set>
+                                  </p:childTnLst>
+                                </p:cTn>
+                              </p:par>
+                              <p:par>
+                                <p:cTn id="8" presetID="3" presetClass="emph" presetSubtype="2" fill="hold" grpId="0" nodeType="withEffect">
+                                  <p:stCondLst>
+                                    <p:cond delay="0"/>
+                                  </p:stCondLst>
+                                  <p:childTnLst>
+                                    <p:animClr clrSpc="rgb" dir="cw">
+                                      <p:cBhvr override="childStyle">
+                                        <p:cTn id="9" dur="500" fill="hold"/>
+                                        <p:tgtEl>
+                                          <p:spTgt spid="10"/>
+                                        </p:tgtEl>
+                                        <p:attrNameLst>
+                                          <p:attrName>style.color</p:attrName>
+                                        </p:attrNameLst>
+                                      </p:cBhvr>
+                                      <p:to>
+                                        <a:srgbClr val="92D050"/>
+                                      </p:to>
+                                    </p:animClr>
+                                  </p:childTnLst>
+                                </p:cTn>
+                              </p:par>
+                            </p:childTnLst>
+                          </p:cTn>
+                        </p:par>
+                      </p:childTnLst>
+                    </p:cTn>
+                  </p:par>
+                  <p:par>
+                    <p:cTn id="10" fill="hold">
+                      <p:stCondLst>
+                        <p:cond delay="indefinite"/>
+                      </p:stCondLst>
+                      <p:childTnLst>
+                        <p:par>
+                          <p:cTn id="11" fill="hold">
+                            <p:stCondLst>
+                              <p:cond delay="0"/>
+                            </p:stCondLst>
+                            <p:childTnLst>
+                              <p:par>
+                                <p:cTn id="12" presetID="7" presetClass="emph" presetSubtype="2" fill="hold" nodeType="clickEffect">
+                                  <p:stCondLst>
+                                    <p:cond delay="0"/>
+                                  </p:stCondLst>
+                                  <p:childTnLst>
+                                    <p:animClr clrSpc="rgb" dir="cw">
+                                      <p:cBhvr>
+                                        <p:cTn id="13" dur="500" fill="hold"/>
+                                        <p:tgtEl>
+                                          <p:spTgt spid="3"/>
+                                        </p:tgtEl>
+                                        <p:attrNameLst>
+                                          <p:attrName>stroke.color</p:attrName>
+                                        </p:attrNameLst>
+                                      </p:cBhvr>
+                                      <p:to>
+                                        <a:srgbClr val="F0EA00"/>
+                                      </p:to>
+                                    </p:animClr>
+                                    <p:set>
+                                      <p:cBhvr>
+                                        <p:cTn id="14" dur="500" fill="hold"/>
+                                        <p:tgtEl>
+                                          <p:spTgt spid="3"/>
+                                        </p:tgtEl>
+                                        <p:attrNameLst>
+                                          <p:attrName>stroke.on</p:attrName>
+                                        </p:attrNameLst>
+                                      </p:cBhvr>
+                                      <p:to>
+                                        <p:strVal val="true"/>
+                                      </p:to>
+                                    </p:set>
+                                  </p:childTnLst>
+                                </p:cTn>
+                              </p:par>
+                              <p:par>
+                                <p:cTn id="15" presetID="3" presetClass="emph" presetSubtype="2" fill="hold" grpId="0" nodeType="withEffect">
+                                  <p:stCondLst>
+                                    <p:cond delay="0"/>
+                                  </p:stCondLst>
+                                  <p:childTnLst>
+                                    <p:animClr clrSpc="rgb" dir="cw">
+                                      <p:cBhvr override="childStyle">
+                                        <p:cTn id="16" dur="500" fill="hold"/>
+                                        <p:tgtEl>
+                                          <p:spTgt spid="7"/>
+                                        </p:tgtEl>
+                                        <p:attrNameLst>
+                                          <p:attrName>style.color</p:attrName>
+                                        </p:attrNameLst>
+                                      </p:cBhvr>
+                                      <p:to>
+                                        <a:srgbClr val="F0EA00"/>
+                                      </p:to>
+                                    </p:animClr>
+                                  </p:childTnLst>
+                                </p:cTn>
+                              </p:par>
+                            </p:childTnLst>
+                          </p:cTn>
+                        </p:par>
+                      </p:childTnLst>
+                    </p:cTn>
+                  </p:par>
+                  <p:par>
+                    <p:cTn id="17" fill="hold">
+                      <p:stCondLst>
+                        <p:cond delay="indefinite"/>
+                      </p:stCondLst>
+                      <p:childTnLst>
+                        <p:par>
+                          <p:cTn id="18" fill="hold">
+                            <p:stCondLst>
+                              <p:cond delay="0"/>
+                            </p:stCondLst>
+                            <p:childTnLst>
+                              <p:par>
+                                <p:cTn id="19" presetID="7" presetClass="emph" presetSubtype="2" fill="hold" nodeType="clickEffect">
+                                  <p:stCondLst>
+                                    <p:cond delay="0"/>
+                                  </p:stCondLst>
+                                  <p:childTnLst>
+                                    <p:animClr clrSpc="rgb" dir="cw">
+                                      <p:cBhvr>
+                                        <p:cTn id="20" dur="500" fill="hold"/>
+                                        <p:tgtEl>
+                                          <p:spTgt spid="5"/>
+                                        </p:tgtEl>
+                                        <p:attrNameLst>
+                                          <p:attrName>stroke.color</p:attrName>
+                                        </p:attrNameLst>
+                                      </p:cBhvr>
+                                      <p:to>
+                                        <a:schemeClr val="accent2"/>
+                                      </p:to>
+                                    </p:animClr>
+                                    <p:set>
+                                      <p:cBhvr>
+                                        <p:cTn id="21" dur="500" fill="hold"/>
+                                        <p:tgtEl>
+                                          <p:spTgt spid="5"/>
+                                        </p:tgtEl>
+                                        <p:attrNameLst>
+                                          <p:attrName>stroke.on</p:attrName>
+                                        </p:attrNameLst>
+                                      </p:cBhvr>
+                                      <p:to>
+                                        <p:strVal val="true"/>
+                                      </p:to>
+                                    </p:set>
+                                  </p:childTnLst>
+                                </p:cTn>
+                              </p:par>
+                              <p:par>
+                                <p:cTn id="22" presetID="3" presetClass="emph" presetSubtype="2" fill="hold" grpId="0" nodeType="withEffect">
+                                  <p:stCondLst>
+                                    <p:cond delay="0"/>
+                                  </p:stCondLst>
+                                  <p:childTnLst>
+                                    <p:animClr clrSpc="rgb" dir="cw">
+                                      <p:cBhvr override="childStyle">
+                                        <p:cTn id="23" dur="500" fill="hold"/>
+                                        <p:tgtEl>
+                                          <p:spTgt spid="6"/>
+                                        </p:tgtEl>
+                                        <p:attrNameLst>
+                                          <p:attrName>style.color</p:attrName>
+                                        </p:attrNameLst>
+                                      </p:cBhvr>
+                                      <p:to>
+                                        <a:schemeClr val="accent2"/>
+                                      </p:to>
+                                    </p:animClr>
+                                  </p:childTnLst>
+                                </p:cTn>
+                              </p:par>
+                            </p:childTnLst>
+                          </p:cTn>
+                        </p:par>
+                      </p:childTnLst>
+                    </p:cTn>
+                  </p:par>
+                </p:childTnLst>
+              </p:cTn>
+              <p:prevCondLst>
+                <p:cond evt="onPrev" delay="0">
+                  <p:tgtEl>
+                    <p:sldTgt/>
+                  </p:tgtEl>
+                </p:cond>
+              </p:prevCondLst>
+              <p:nextCondLst>
+                <p:cond evt="onNext" delay="0">
+                  <p:tgtEl>
+                    <p:sldTgt/>
+                  </p:tgtEl>
+                </p:cond>
+              </p:nextCondLst>
+            </p:seq>
+          </p:childTnLst>
+        </p:cTn>
+      </p:par>
+    </p:tnLst>
+    <p:bldLst>
+      <p:bldP spid="6" grpId="0"/>
+      <p:bldP spid="7" grpId="0"/>
+      <p:bldP spid="10" grpId="0"/>
+    </p:bldLst>
+  </p:timing>
+</p:sld>
+</file>
+
+<file path=ppt/slides/slide8.xml><?xml version="1.0" encoding="utf-8"?>
+<p:sld xmlns:a="http://schemas.openxmlformats.org/drawingml/2006/main" xmlns:r="http://schemas.openxmlformats.org/officeDocument/2006/relationships" xmlns:p="http://schemas.openxmlformats.org/presentationml/2006/main">
+  <p:cSld>
+    <p:spTree>
+      <p:nvGrpSpPr>
+        <p:cNvPr id="1" name=""/>
+        <p:cNvGrpSpPr/>
+        <p:nvPr/>
+      </p:nvGrpSpPr>
+      <p:grpSpPr>
+        <a:xfrm>
+          <a:off x="0" y="0"/>
+          <a:ext cx="0" cy="0"/>
+          <a:chOff x="0" y="0"/>
+          <a:chExt cx="0" cy="0"/>
+        </a:xfrm>
+      </p:grpSpPr>
+      <p:pic>
+        <p:nvPicPr>
+          <p:cNvPr id="3" name="Image 2">
+            <a:extLst>
+              <a:ext uri="{FF2B5EF4-FFF2-40B4-BE49-F238E27FC236}">
+                <a16:creationId xmlns:a16="http://schemas.microsoft.com/office/drawing/2014/main" id="{503940DC-B7CE-F426-30C0-654000CCDD47}"/>
               </a:ext>
             </a:extLst>
           </p:cNvPr>
@@ -3950,67 +4675,636 @@
           </p:cNvPicPr>
           <p:nvPr/>
         </p:nvPicPr>
-        <p:blipFill rotWithShape="1">
-          <a:blip r:embed="rId2"/>
-          <a:srcRect b="19"/>
+        <p:blipFill>
+          <a:blip r:embed="rId2">
+            <a:extLst>
+              <a:ext uri="{28A0092B-C50C-407E-A947-70E740481C1C}">
+                <a14:useLocalDpi xmlns:a14="http://schemas.microsoft.com/office/drawing/2010/main" val="0"/>
+              </a:ext>
+            </a:extLst>
+          </a:blip>
+          <a:srcRect/>
           <a:stretch/>
         </p:blipFill>
         <p:spPr>
           <a:xfrm>
-            <a:off x="20" y="1282"/>
-            <a:ext cx="12191980" cy="6856718"/>
+            <a:off x="1" y="0"/>
+            <a:ext cx="12191997" cy="6857999"/>
           </a:xfrm>
           <a:prstGeom prst="rect">
             <a:avLst/>
           </a:prstGeom>
         </p:spPr>
       </p:pic>
-      <p:sp>
-        <p:nvSpPr>
-          <p:cNvPr id="4" name="Titre 3">
-            <a:extLst>
-              <a:ext uri="{FF2B5EF4-FFF2-40B4-BE49-F238E27FC236}">
-                <a16:creationId xmlns:a16="http://schemas.microsoft.com/office/drawing/2014/main" id="{FD5584B7-531A-7DD7-0287-7D504A7483F7}"/>
-              </a:ext>
-            </a:extLst>
-          </p:cNvPr>
-          <p:cNvSpPr>
-            <a:spLocks noGrp="1"/>
-          </p:cNvSpPr>
-          <p:nvPr>
-            <p:ph type="title"/>
-          </p:nvPr>
+      <p:pic>
+        <p:nvPicPr>
+          <p:cNvPr id="18" name="Image 17">
+            <a:extLst>
+              <a:ext uri="{FF2B5EF4-FFF2-40B4-BE49-F238E27FC236}">
+                <a16:creationId xmlns:a16="http://schemas.microsoft.com/office/drawing/2014/main" id="{787151FB-2BEF-3526-5FE3-BCC773AF9FA9}"/>
+              </a:ext>
+            </a:extLst>
+          </p:cNvPr>
+          <p:cNvPicPr>
+            <a:picLocks noChangeAspect="1"/>
+          </p:cNvPicPr>
+          <p:nvPr/>
+        </p:nvPicPr>
+        <p:blipFill>
+          <a:blip r:embed="rId3">
+            <a:extLst>
+              <a:ext uri="{28A0092B-C50C-407E-A947-70E740481C1C}">
+                <a14:useLocalDpi xmlns:a14="http://schemas.microsoft.com/office/drawing/2010/main" val="0"/>
+              </a:ext>
+            </a:extLst>
+          </a:blip>
+          <a:srcRect/>
+          <a:stretch/>
+        </p:blipFill>
+        <p:spPr>
+          <a:xfrm rot="16520495">
+            <a:off x="716407" y="497138"/>
+            <a:ext cx="1402949" cy="1352443"/>
+          </a:xfrm>
+          <a:prstGeom prst="rect">
+            <a:avLst/>
+          </a:prstGeom>
+        </p:spPr>
+      </p:pic>
+      <p:pic>
+        <p:nvPicPr>
+          <p:cNvPr id="21" name="Image 20">
+            <a:extLst>
+              <a:ext uri="{FF2B5EF4-FFF2-40B4-BE49-F238E27FC236}">
+                <a16:creationId xmlns:a16="http://schemas.microsoft.com/office/drawing/2014/main" id="{A29EE7D8-BE25-9A1E-6F3B-90C386202535}"/>
+              </a:ext>
+            </a:extLst>
+          </p:cNvPr>
+          <p:cNvPicPr>
+            <a:picLocks noChangeAspect="1"/>
+          </p:cNvPicPr>
+          <p:nvPr/>
+        </p:nvPicPr>
+        <p:blipFill>
+          <a:blip r:embed="rId4">
+            <a:extLst>
+              <a:ext uri="{28A0092B-C50C-407E-A947-70E740481C1C}">
+                <a14:useLocalDpi xmlns:a14="http://schemas.microsoft.com/office/drawing/2010/main" val="0"/>
+              </a:ext>
+            </a:extLst>
+          </a:blip>
+          <a:srcRect/>
+          <a:stretch/>
+        </p:blipFill>
+        <p:spPr>
+          <a:xfrm rot="16520495">
+            <a:off x="715012" y="497138"/>
+            <a:ext cx="1402949" cy="1352443"/>
+          </a:xfrm>
+          <a:prstGeom prst="rect">
+            <a:avLst/>
+          </a:prstGeom>
+        </p:spPr>
+      </p:pic>
+      <p:cxnSp>
+        <p:nvCxnSpPr>
+          <p:cNvPr id="12" name="Connecteur droit 11">
+            <a:extLst>
+              <a:ext uri="{FF2B5EF4-FFF2-40B4-BE49-F238E27FC236}">
+                <a16:creationId xmlns:a16="http://schemas.microsoft.com/office/drawing/2014/main" id="{265F7E93-E2F0-C97E-5D55-417CBA1A4F8C}"/>
+              </a:ext>
+            </a:extLst>
+          </p:cNvPr>
+          <p:cNvCxnSpPr>
+            <a:cxnSpLocks/>
+          </p:cNvCxnSpPr>
+          <p:nvPr/>
+        </p:nvCxnSpPr>
+        <p:spPr>
+          <a:xfrm rot="17163022" flipH="1">
+            <a:off x="1549027" y="1638886"/>
+            <a:ext cx="105408" cy="149637"/>
+          </a:xfrm>
+          <a:prstGeom prst="line">
+            <a:avLst/>
+          </a:prstGeom>
+          <a:ln w="63500" cap="rnd">
+            <a:solidFill>
+              <a:schemeClr val="bg1">
+                <a:lumMod val="50000"/>
+              </a:schemeClr>
+            </a:solidFill>
+          </a:ln>
+        </p:spPr>
+        <p:style>
+          <a:lnRef idx="1">
+            <a:schemeClr val="dk1"/>
+          </a:lnRef>
+          <a:fillRef idx="0">
+            <a:schemeClr val="dk1"/>
+          </a:fillRef>
+          <a:effectRef idx="0">
+            <a:schemeClr val="dk1"/>
+          </a:effectRef>
+          <a:fontRef idx="minor">
+            <a:schemeClr val="tx1"/>
+          </a:fontRef>
+        </p:style>
+      </p:cxnSp>
+      <p:cxnSp>
+        <p:nvCxnSpPr>
+          <p:cNvPr id="13" name="Connecteur droit 12">
+            <a:extLst>
+              <a:ext uri="{FF2B5EF4-FFF2-40B4-BE49-F238E27FC236}">
+                <a16:creationId xmlns:a16="http://schemas.microsoft.com/office/drawing/2014/main" id="{C9455344-E8E8-9E92-0ECE-ED3F66E396BE}"/>
+              </a:ext>
+            </a:extLst>
+          </p:cNvPr>
+          <p:cNvCxnSpPr>
+            <a:cxnSpLocks/>
+          </p:cNvCxnSpPr>
+          <p:nvPr/>
+        </p:nvCxnSpPr>
+        <p:spPr>
+          <a:xfrm rot="17163022" flipH="1">
+            <a:off x="1681469" y="1637872"/>
+            <a:ext cx="105408" cy="149637"/>
+          </a:xfrm>
+          <a:prstGeom prst="line">
+            <a:avLst/>
+          </a:prstGeom>
+          <a:ln w="63500" cap="rnd">
+            <a:solidFill>
+              <a:schemeClr val="bg1">
+                <a:lumMod val="50000"/>
+              </a:schemeClr>
+            </a:solidFill>
+          </a:ln>
+        </p:spPr>
+        <p:style>
+          <a:lnRef idx="1">
+            <a:schemeClr val="dk1"/>
+          </a:lnRef>
+          <a:fillRef idx="0">
+            <a:schemeClr val="dk1"/>
+          </a:fillRef>
+          <a:effectRef idx="0">
+            <a:schemeClr val="dk1"/>
+          </a:effectRef>
+          <a:fontRef idx="minor">
+            <a:schemeClr val="tx1"/>
+          </a:fontRef>
+        </p:style>
+      </p:cxnSp>
+      <p:cxnSp>
+        <p:nvCxnSpPr>
+          <p:cNvPr id="14" name="Connecteur droit 13">
+            <a:extLst>
+              <a:ext uri="{FF2B5EF4-FFF2-40B4-BE49-F238E27FC236}">
+                <a16:creationId xmlns:a16="http://schemas.microsoft.com/office/drawing/2014/main" id="{C8CAF81C-5AB3-636E-F617-D77E1228479E}"/>
+              </a:ext>
+            </a:extLst>
+          </p:cNvPr>
+          <p:cNvCxnSpPr>
+            <a:cxnSpLocks/>
+          </p:cNvCxnSpPr>
+          <p:nvPr/>
+        </p:nvCxnSpPr>
+        <p:spPr>
+          <a:xfrm rot="17163022" flipH="1">
+            <a:off x="1839311" y="1515568"/>
+            <a:ext cx="105408" cy="149637"/>
+          </a:xfrm>
+          <a:prstGeom prst="line">
+            <a:avLst/>
+          </a:prstGeom>
+          <a:ln w="63500" cap="rnd">
+            <a:solidFill>
+              <a:schemeClr val="bg1">
+                <a:lumMod val="50000"/>
+              </a:schemeClr>
+            </a:solidFill>
+          </a:ln>
+        </p:spPr>
+        <p:style>
+          <a:lnRef idx="1">
+            <a:schemeClr val="dk1"/>
+          </a:lnRef>
+          <a:fillRef idx="0">
+            <a:schemeClr val="dk1"/>
+          </a:fillRef>
+          <a:effectRef idx="0">
+            <a:schemeClr val="dk1"/>
+          </a:effectRef>
+          <a:fontRef idx="minor">
+            <a:schemeClr val="tx1"/>
+          </a:fontRef>
+        </p:style>
+      </p:cxnSp>
+      <p:cxnSp>
+        <p:nvCxnSpPr>
+          <p:cNvPr id="15" name="Connecteur droit 14">
+            <a:extLst>
+              <a:ext uri="{FF2B5EF4-FFF2-40B4-BE49-F238E27FC236}">
+                <a16:creationId xmlns:a16="http://schemas.microsoft.com/office/drawing/2014/main" id="{DCB5296A-E305-895D-8C0A-14714336E228}"/>
+              </a:ext>
+            </a:extLst>
+          </p:cNvPr>
+          <p:cNvCxnSpPr>
+            <a:cxnSpLocks/>
+          </p:cNvCxnSpPr>
+          <p:nvPr/>
+        </p:nvCxnSpPr>
+        <p:spPr>
+          <a:xfrm rot="17163022" flipH="1">
+            <a:off x="1869538" y="1391305"/>
+            <a:ext cx="105408" cy="149637"/>
+          </a:xfrm>
+          <a:prstGeom prst="line">
+            <a:avLst/>
+          </a:prstGeom>
+          <a:ln w="63500" cap="rnd">
+            <a:solidFill>
+              <a:schemeClr val="bg1">
+                <a:lumMod val="50000"/>
+              </a:schemeClr>
+            </a:solidFill>
+          </a:ln>
+        </p:spPr>
+        <p:style>
+          <a:lnRef idx="1">
+            <a:schemeClr val="dk1"/>
+          </a:lnRef>
+          <a:fillRef idx="0">
+            <a:schemeClr val="dk1"/>
+          </a:fillRef>
+          <a:effectRef idx="0">
+            <a:schemeClr val="dk1"/>
+          </a:effectRef>
+          <a:fontRef idx="minor">
+            <a:schemeClr val="tx1"/>
+          </a:fontRef>
+        </p:style>
+      </p:cxnSp>
+      <p:cxnSp>
+        <p:nvCxnSpPr>
+          <p:cNvPr id="16" name="Connecteur droit 15">
+            <a:extLst>
+              <a:ext uri="{FF2B5EF4-FFF2-40B4-BE49-F238E27FC236}">
+                <a16:creationId xmlns:a16="http://schemas.microsoft.com/office/drawing/2014/main" id="{5FC2B7A1-5663-E831-3277-CBAD7E00FEF2}"/>
+              </a:ext>
+            </a:extLst>
+          </p:cNvPr>
+          <p:cNvCxnSpPr>
+            <a:cxnSpLocks/>
+          </p:cNvCxnSpPr>
+          <p:nvPr/>
+        </p:nvCxnSpPr>
+        <p:spPr>
+          <a:xfrm rot="17163022" flipH="1">
+            <a:off x="1770373" y="1585335"/>
+            <a:ext cx="154059" cy="215668"/>
+          </a:xfrm>
+          <a:prstGeom prst="line">
+            <a:avLst/>
+          </a:prstGeom>
+          <a:ln w="63500" cap="rnd">
+            <a:solidFill>
+              <a:schemeClr val="bg1">
+                <a:lumMod val="50000"/>
+              </a:schemeClr>
+            </a:solidFill>
+          </a:ln>
+        </p:spPr>
+        <p:style>
+          <a:lnRef idx="1">
+            <a:schemeClr val="dk1"/>
+          </a:lnRef>
+          <a:fillRef idx="0">
+            <a:schemeClr val="dk1"/>
+          </a:fillRef>
+          <a:effectRef idx="0">
+            <a:schemeClr val="dk1"/>
+          </a:effectRef>
+          <a:fontRef idx="minor">
+            <a:schemeClr val="tx1"/>
+          </a:fontRef>
+        </p:style>
+      </p:cxnSp>
+      <p:sp>
+        <p:nvSpPr>
+          <p:cNvPr id="27" name="Accolade fermante 26">
+            <a:extLst>
+              <a:ext uri="{FF2B5EF4-FFF2-40B4-BE49-F238E27FC236}">
+                <a16:creationId xmlns:a16="http://schemas.microsoft.com/office/drawing/2014/main" id="{9E616FB4-142A-A07C-C380-153A1F06C551}"/>
+              </a:ext>
+            </a:extLst>
+          </p:cNvPr>
+          <p:cNvSpPr/>
+          <p:nvPr/>
         </p:nvSpPr>
         <p:spPr>
           <a:xfrm>
-            <a:off x="838200" y="365125"/>
-            <a:ext cx="10515600" cy="5749297"/>
+            <a:off x="8379588" y="408899"/>
+            <a:ext cx="469257" cy="2910840"/>
           </a:xfrm>
-          <a:effectLst>
-            <a:glow rad="127000">
-              <a:schemeClr val="tx1"/>
-            </a:glow>
-          </a:effectLst>
+          <a:prstGeom prst="rightBrace">
+            <a:avLst/>
+          </a:prstGeom>
+          <a:ln w="50800" cap="rnd">
+            <a:solidFill>
+              <a:schemeClr val="bg1">
+                <a:lumMod val="50000"/>
+              </a:schemeClr>
+            </a:solidFill>
+          </a:ln>
         </p:spPr>
-        <p:txBody>
-          <a:bodyPr>
-            <a:normAutofit/>
+        <p:style>
+          <a:lnRef idx="1">
+            <a:schemeClr val="accent3"/>
+          </a:lnRef>
+          <a:fillRef idx="0">
+            <a:schemeClr val="accent3"/>
+          </a:fillRef>
+          <a:effectRef idx="0">
+            <a:schemeClr val="accent3"/>
+          </a:effectRef>
+          <a:fontRef idx="minor">
+            <a:schemeClr val="tx1"/>
+          </a:fontRef>
+        </p:style>
+        <p:txBody>
+          <a:bodyPr rtlCol="0" anchor="ctr"/>
+          <a:lstStyle/>
+          <a:p>
+            <a:pPr algn="ctr"/>
+            <a:endParaRPr lang="fr-FR">
+              <a:noFill/>
+            </a:endParaRPr>
+          </a:p>
+        </p:txBody>
+      </p:sp>
+      <p:sp>
+        <p:nvSpPr>
+          <p:cNvPr id="28" name="Accolade fermante 27">
+            <a:extLst>
+              <a:ext uri="{FF2B5EF4-FFF2-40B4-BE49-F238E27FC236}">
+                <a16:creationId xmlns:a16="http://schemas.microsoft.com/office/drawing/2014/main" id="{3C77989A-ABAF-6527-E9C6-6B53BE72B362}"/>
+              </a:ext>
+            </a:extLst>
+          </p:cNvPr>
+          <p:cNvSpPr/>
+          <p:nvPr/>
+        </p:nvSpPr>
+        <p:spPr>
+          <a:xfrm>
+            <a:off x="8379588" y="3538261"/>
+            <a:ext cx="510540" cy="2910840"/>
+          </a:xfrm>
+          <a:prstGeom prst="rightBrace">
+            <a:avLst/>
+          </a:prstGeom>
+          <a:ln w="50800" cap="rnd">
+            <a:solidFill>
+              <a:schemeClr val="bg1">
+                <a:lumMod val="50000"/>
+              </a:schemeClr>
+            </a:solidFill>
+          </a:ln>
+        </p:spPr>
+        <p:style>
+          <a:lnRef idx="1">
+            <a:schemeClr val="accent3"/>
+          </a:lnRef>
+          <a:fillRef idx="0">
+            <a:schemeClr val="accent3"/>
+          </a:fillRef>
+          <a:effectRef idx="0">
+            <a:schemeClr val="accent3"/>
+          </a:effectRef>
+          <a:fontRef idx="minor">
+            <a:schemeClr val="tx1"/>
+          </a:fontRef>
+        </p:style>
+        <p:txBody>
+          <a:bodyPr rtlCol="0" anchor="ctr"/>
+          <a:lstStyle/>
+          <a:p>
+            <a:pPr algn="ctr"/>
+            <a:endParaRPr lang="fr-FR">
+              <a:noFill/>
+            </a:endParaRPr>
+          </a:p>
+        </p:txBody>
+      </p:sp>
+      <p:sp>
+        <p:nvSpPr>
+          <p:cNvPr id="29" name="ZoneTexte 28">
+            <a:extLst>
+              <a:ext uri="{FF2B5EF4-FFF2-40B4-BE49-F238E27FC236}">
+                <a16:creationId xmlns:a16="http://schemas.microsoft.com/office/drawing/2014/main" id="{26DDDD20-E3FA-CF01-CFC6-9D167C68141F}"/>
+              </a:ext>
+            </a:extLst>
+          </p:cNvPr>
+          <p:cNvSpPr txBox="1"/>
+          <p:nvPr/>
+        </p:nvSpPr>
+        <p:spPr>
+          <a:xfrm>
+            <a:off x="9082267" y="4701293"/>
+            <a:ext cx="2098876" cy="584775"/>
+          </a:xfrm>
+          <a:prstGeom prst="rect">
+            <a:avLst/>
+          </a:prstGeom>
+          <a:noFill/>
+        </p:spPr>
+        <p:txBody>
+          <a:bodyPr wrap="square" rtlCol="0">
+            <a:spAutoFit/>
           </a:bodyPr>
           <a:lstStyle/>
           <a:p>
-            <a:pPr algn="ctr"/>
-            <a:r>
-              <a:rPr lang="fr-FR" sz="6600" b="1" dirty="0">
+            <a:r>
+              <a:rPr lang="fr-FR" sz="3200" b="1" dirty="0">
                 <a:solidFill>
-                  <a:srgbClr val="FF0000"/>
+                  <a:schemeClr val="tx1">
+                    <a:lumMod val="50000"/>
+                    <a:lumOff val="50000"/>
+                  </a:schemeClr>
                 </a:solidFill>
-                <a:effectLst>
-                  <a:glow rad="127000">
-                    <a:schemeClr val="bg1"/>
-                  </a:glow>
-                </a:effectLst>
               </a:rPr>
-              <a:t>Aimez-vous Toulouse?</a:t>
+              <a:t>1</a:t>
+            </a:r>
+            <a:r>
+              <a:rPr lang="fr-FR" sz="3200" b="1" baseline="30000" dirty="0">
+                <a:solidFill>
+                  <a:schemeClr val="tx1">
+                    <a:lumMod val="50000"/>
+                    <a:lumOff val="50000"/>
+                  </a:schemeClr>
+                </a:solidFill>
+              </a:rPr>
+              <a:t>ère</a:t>
+            </a:r>
+            <a:r>
+              <a:rPr lang="fr-FR" sz="3200" b="1" dirty="0">
+                <a:solidFill>
+                  <a:schemeClr val="tx1">
+                    <a:lumMod val="50000"/>
+                    <a:lumOff val="50000"/>
+                  </a:schemeClr>
+                </a:solidFill>
+              </a:rPr>
+              <a:t> Partie</a:t>
+            </a:r>
+          </a:p>
+        </p:txBody>
+      </p:sp>
+      <p:sp>
+        <p:nvSpPr>
+          <p:cNvPr id="30" name="ZoneTexte 29">
+            <a:extLst>
+              <a:ext uri="{FF2B5EF4-FFF2-40B4-BE49-F238E27FC236}">
+                <a16:creationId xmlns:a16="http://schemas.microsoft.com/office/drawing/2014/main" id="{139794F0-F297-9FFD-D4D2-CA649E72A603}"/>
+              </a:ext>
+            </a:extLst>
+          </p:cNvPr>
+          <p:cNvSpPr txBox="1"/>
+          <p:nvPr/>
+        </p:nvSpPr>
+        <p:spPr>
+          <a:xfrm>
+            <a:off x="9082267" y="1571931"/>
+            <a:ext cx="2098876" cy="584775"/>
+          </a:xfrm>
+          <a:prstGeom prst="rect">
+            <a:avLst/>
+          </a:prstGeom>
+          <a:noFill/>
+        </p:spPr>
+        <p:txBody>
+          <a:bodyPr wrap="square" rtlCol="0">
+            <a:spAutoFit/>
+          </a:bodyPr>
+          <a:lstStyle/>
+          <a:p>
+            <a:r>
+              <a:rPr lang="fr-FR" sz="3200" b="1" dirty="0">
+                <a:solidFill>
+                  <a:schemeClr val="tx1">
+                    <a:lumMod val="50000"/>
+                    <a:lumOff val="50000"/>
+                  </a:schemeClr>
+                </a:solidFill>
+              </a:rPr>
+              <a:t>2</a:t>
+            </a:r>
+            <a:r>
+              <a:rPr lang="fr-FR" sz="3200" b="1" baseline="30000" dirty="0">
+                <a:solidFill>
+                  <a:schemeClr val="tx1">
+                    <a:lumMod val="50000"/>
+                    <a:lumOff val="50000"/>
+                  </a:schemeClr>
+                </a:solidFill>
+              </a:rPr>
+              <a:t>ème</a:t>
+            </a:r>
+            <a:r>
+              <a:rPr lang="fr-FR" sz="3200" b="1" dirty="0">
+                <a:solidFill>
+                  <a:schemeClr val="tx1">
+                    <a:lumMod val="50000"/>
+                    <a:lumOff val="50000"/>
+                  </a:schemeClr>
+                </a:solidFill>
+              </a:rPr>
+              <a:t> Partie</a:t>
+            </a:r>
+          </a:p>
+        </p:txBody>
+      </p:sp>
+      <p:sp>
+        <p:nvSpPr>
+          <p:cNvPr id="2" name="ZoneTexte 1">
+            <a:extLst>
+              <a:ext uri="{FF2B5EF4-FFF2-40B4-BE49-F238E27FC236}">
+                <a16:creationId xmlns:a16="http://schemas.microsoft.com/office/drawing/2014/main" id="{3D0E2BE3-E652-FCAD-7AA5-4EF99CAAFA63}"/>
+              </a:ext>
+            </a:extLst>
+          </p:cNvPr>
+          <p:cNvSpPr txBox="1"/>
+          <p:nvPr/>
+        </p:nvSpPr>
+        <p:spPr>
+          <a:xfrm>
+            <a:off x="2885166" y="1262693"/>
+            <a:ext cx="2553904" cy="600164"/>
+          </a:xfrm>
+          <a:prstGeom prst="rect">
+            <a:avLst/>
+          </a:prstGeom>
+          <a:noFill/>
+        </p:spPr>
+        <p:txBody>
+          <a:bodyPr wrap="none" rtlCol="0">
+            <a:spAutoFit/>
+          </a:bodyPr>
+          <a:lstStyle/>
+          <a:p>
+            <a:r>
+              <a:rPr lang="fr-FR" sz="3300" b="1" dirty="0">
+                <a:solidFill>
+                  <a:schemeClr val="tx1">
+                    <a:lumMod val="50000"/>
+                    <a:lumOff val="50000"/>
+                  </a:schemeClr>
+                </a:solidFill>
+              </a:rPr>
+              <a:t>4	ElGamal</a:t>
+            </a:r>
+          </a:p>
+        </p:txBody>
+      </p:sp>
+      <p:sp>
+        <p:nvSpPr>
+          <p:cNvPr id="4" name="ZoneTexte 3">
+            <a:extLst>
+              <a:ext uri="{FF2B5EF4-FFF2-40B4-BE49-F238E27FC236}">
+                <a16:creationId xmlns:a16="http://schemas.microsoft.com/office/drawing/2014/main" id="{E3A8B1D7-4211-982D-FFCA-3338F5EEC9BC}"/>
+              </a:ext>
+            </a:extLst>
+          </p:cNvPr>
+          <p:cNvSpPr txBox="1"/>
+          <p:nvPr/>
+        </p:nvSpPr>
+        <p:spPr>
+          <a:xfrm>
+            <a:off x="2885166" y="441839"/>
+            <a:ext cx="4477444" cy="600164"/>
+          </a:xfrm>
+          <a:prstGeom prst="rect">
+            <a:avLst/>
+          </a:prstGeom>
+          <a:noFill/>
+        </p:spPr>
+        <p:txBody>
+          <a:bodyPr wrap="none" rtlCol="0">
+            <a:spAutoFit/>
+          </a:bodyPr>
+          <a:lstStyle/>
+          <a:p>
+            <a:r>
+              <a:rPr lang="fr-FR" sz="3300" b="1" dirty="0">
+                <a:solidFill>
+                  <a:schemeClr val="tx1">
+                    <a:lumMod val="50000"/>
+                    <a:lumOff val="50000"/>
+                  </a:schemeClr>
+                </a:solidFill>
+              </a:rPr>
+              <a:t>5	Courbes Elliptiques</a:t>
             </a:r>
           </a:p>
         </p:txBody>
@@ -4018,13 +5312,905 @@
     </p:spTree>
     <p:extLst>
       <p:ext uri="{BB962C8B-B14F-4D97-AF65-F5344CB8AC3E}">
-        <p14:creationId xmlns:p14="http://schemas.microsoft.com/office/powerpoint/2010/main" val="3221849862"/>
+        <p14:creationId xmlns:p14="http://schemas.microsoft.com/office/powerpoint/2010/main" val="1839252942"/>
       </p:ext>
     </p:extLst>
   </p:cSld>
   <p:clrMapOvr>
     <a:masterClrMapping/>
   </p:clrMapOvr>
+  <p:timing>
+    <p:tnLst>
+      <p:par>
+        <p:cTn id="1" dur="indefinite" restart="never" nodeType="tmRoot">
+          <p:childTnLst>
+            <p:seq concurrent="1" nextAc="seek">
+              <p:cTn id="2" dur="indefinite" nodeType="mainSeq">
+                <p:childTnLst>
+                  <p:par>
+                    <p:cTn id="3" fill="hold">
+                      <p:stCondLst>
+                        <p:cond delay="indefinite"/>
+                      </p:stCondLst>
+                      <p:childTnLst>
+                        <p:par>
+                          <p:cTn id="4" fill="hold">
+                            <p:stCondLst>
+                              <p:cond delay="0"/>
+                            </p:stCondLst>
+                            <p:childTnLst>
+                              <p:par>
+                                <p:cTn id="5" presetID="6" presetClass="emph" presetSubtype="0" fill="hold" nodeType="clickEffect">
+                                  <p:stCondLst>
+                                    <p:cond delay="0"/>
+                                  </p:stCondLst>
+                                  <p:childTnLst>
+                                    <p:animScale>
+                                      <p:cBhvr>
+                                        <p:cTn id="6" dur="500" fill="hold"/>
+                                        <p:tgtEl>
+                                          <p:spTgt spid="3"/>
+                                        </p:tgtEl>
+                                      </p:cBhvr>
+                                      <p:by x="50000" y="50000"/>
+                                    </p:animScale>
+                                  </p:childTnLst>
+                                </p:cTn>
+                              </p:par>
+                              <p:par>
+                                <p:cTn id="7" presetID="42" presetClass="path" presetSubtype="0" fill="hold" nodeType="withEffect">
+                                  <p:stCondLst>
+                                    <p:cond delay="0"/>
+                                  </p:stCondLst>
+                                  <p:childTnLst>
+                                    <p:animMotion origin="layout" path="M 0 0 L -0.16185 0.25787 " pathEditMode="relative" rAng="0" ptsTypes="AA">
+                                      <p:cBhvr>
+                                        <p:cTn id="8" dur="500" fill="hold"/>
+                                        <p:tgtEl>
+                                          <p:spTgt spid="3"/>
+                                        </p:tgtEl>
+                                        <p:attrNameLst>
+                                          <p:attrName>ppt_x</p:attrName>
+                                          <p:attrName>ppt_y</p:attrName>
+                                        </p:attrNameLst>
+                                      </p:cBhvr>
+                                      <p:rCtr x="-8099" y="12894"/>
+                                    </p:animMotion>
+                                  </p:childTnLst>
+                                </p:cTn>
+                              </p:par>
+                            </p:childTnLst>
+                          </p:cTn>
+                        </p:par>
+                      </p:childTnLst>
+                    </p:cTn>
+                  </p:par>
+                  <p:par>
+                    <p:cTn id="9" fill="hold">
+                      <p:stCondLst>
+                        <p:cond delay="indefinite"/>
+                      </p:stCondLst>
+                      <p:childTnLst>
+                        <p:par>
+                          <p:cTn id="10" fill="hold">
+                            <p:stCondLst>
+                              <p:cond delay="0"/>
+                            </p:stCondLst>
+                            <p:childTnLst>
+                              <p:par>
+                                <p:cTn id="11" presetID="10" presetClass="entr" presetSubtype="0" fill="hold" grpId="0" nodeType="clickEffect">
+                                  <p:stCondLst>
+                                    <p:cond delay="0"/>
+                                  </p:stCondLst>
+                                  <p:childTnLst>
+                                    <p:set>
+                                      <p:cBhvr>
+                                        <p:cTn id="12" dur="1" fill="hold">
+                                          <p:stCondLst>
+                                            <p:cond delay="0"/>
+                                          </p:stCondLst>
+                                        </p:cTn>
+                                        <p:tgtEl>
+                                          <p:spTgt spid="28"/>
+                                        </p:tgtEl>
+                                        <p:attrNameLst>
+                                          <p:attrName>style.visibility</p:attrName>
+                                        </p:attrNameLst>
+                                      </p:cBhvr>
+                                      <p:to>
+                                        <p:strVal val="visible"/>
+                                      </p:to>
+                                    </p:set>
+                                    <p:animEffect transition="in" filter="fade">
+                                      <p:cBhvr>
+                                        <p:cTn id="13" dur="250"/>
+                                        <p:tgtEl>
+                                          <p:spTgt spid="28"/>
+                                        </p:tgtEl>
+                                      </p:cBhvr>
+                                    </p:animEffect>
+                                  </p:childTnLst>
+                                </p:cTn>
+                              </p:par>
+                              <p:par>
+                                <p:cTn id="14" presetID="10" presetClass="entr" presetSubtype="0" fill="hold" grpId="0" nodeType="withEffect">
+                                  <p:stCondLst>
+                                    <p:cond delay="0"/>
+                                  </p:stCondLst>
+                                  <p:childTnLst>
+                                    <p:set>
+                                      <p:cBhvr>
+                                        <p:cTn id="15" dur="1" fill="hold">
+                                          <p:stCondLst>
+                                            <p:cond delay="0"/>
+                                          </p:stCondLst>
+                                        </p:cTn>
+                                        <p:tgtEl>
+                                          <p:spTgt spid="29"/>
+                                        </p:tgtEl>
+                                        <p:attrNameLst>
+                                          <p:attrName>style.visibility</p:attrName>
+                                        </p:attrNameLst>
+                                      </p:cBhvr>
+                                      <p:to>
+                                        <p:strVal val="visible"/>
+                                      </p:to>
+                                    </p:set>
+                                    <p:animEffect transition="in" filter="fade">
+                                      <p:cBhvr>
+                                        <p:cTn id="16" dur="250"/>
+                                        <p:tgtEl>
+                                          <p:spTgt spid="29"/>
+                                        </p:tgtEl>
+                                      </p:cBhvr>
+                                    </p:animEffect>
+                                  </p:childTnLst>
+                                </p:cTn>
+                              </p:par>
+                            </p:childTnLst>
+                          </p:cTn>
+                        </p:par>
+                      </p:childTnLst>
+                    </p:cTn>
+                  </p:par>
+                  <p:par>
+                    <p:cTn id="17" fill="hold">
+                      <p:stCondLst>
+                        <p:cond delay="indefinite"/>
+                      </p:stCondLst>
+                      <p:childTnLst>
+                        <p:par>
+                          <p:cTn id="18" fill="hold">
+                            <p:stCondLst>
+                              <p:cond delay="0"/>
+                            </p:stCondLst>
+                            <p:childTnLst>
+                              <p:par>
+                                <p:cTn id="19" presetID="10" presetClass="entr" presetSubtype="0" fill="hold" grpId="0" nodeType="clickEffect">
+                                  <p:stCondLst>
+                                    <p:cond delay="0"/>
+                                  </p:stCondLst>
+                                  <p:childTnLst>
+                                    <p:set>
+                                      <p:cBhvr>
+                                        <p:cTn id="20" dur="1" fill="hold">
+                                          <p:stCondLst>
+                                            <p:cond delay="0"/>
+                                          </p:stCondLst>
+                                        </p:cTn>
+                                        <p:tgtEl>
+                                          <p:spTgt spid="27"/>
+                                        </p:tgtEl>
+                                        <p:attrNameLst>
+                                          <p:attrName>style.visibility</p:attrName>
+                                        </p:attrNameLst>
+                                      </p:cBhvr>
+                                      <p:to>
+                                        <p:strVal val="visible"/>
+                                      </p:to>
+                                    </p:set>
+                                    <p:animEffect transition="in" filter="fade">
+                                      <p:cBhvr>
+                                        <p:cTn id="21" dur="250"/>
+                                        <p:tgtEl>
+                                          <p:spTgt spid="27"/>
+                                        </p:tgtEl>
+                                      </p:cBhvr>
+                                    </p:animEffect>
+                                  </p:childTnLst>
+                                </p:cTn>
+                              </p:par>
+                              <p:par>
+                                <p:cTn id="22" presetID="10" presetClass="entr" presetSubtype="0" fill="hold" grpId="0" nodeType="withEffect">
+                                  <p:stCondLst>
+                                    <p:cond delay="0"/>
+                                  </p:stCondLst>
+                                  <p:childTnLst>
+                                    <p:set>
+                                      <p:cBhvr>
+                                        <p:cTn id="23" dur="1" fill="hold">
+                                          <p:stCondLst>
+                                            <p:cond delay="0"/>
+                                          </p:stCondLst>
+                                        </p:cTn>
+                                        <p:tgtEl>
+                                          <p:spTgt spid="30"/>
+                                        </p:tgtEl>
+                                        <p:attrNameLst>
+                                          <p:attrName>style.visibility</p:attrName>
+                                        </p:attrNameLst>
+                                      </p:cBhvr>
+                                      <p:to>
+                                        <p:strVal val="visible"/>
+                                      </p:to>
+                                    </p:set>
+                                    <p:animEffect transition="in" filter="fade">
+                                      <p:cBhvr>
+                                        <p:cTn id="24" dur="250"/>
+                                        <p:tgtEl>
+                                          <p:spTgt spid="30"/>
+                                        </p:tgtEl>
+                                      </p:cBhvr>
+                                    </p:animEffect>
+                                  </p:childTnLst>
+                                </p:cTn>
+                              </p:par>
+                            </p:childTnLst>
+                          </p:cTn>
+                        </p:par>
+                        <p:par>
+                          <p:cTn id="25" fill="hold">
+                            <p:stCondLst>
+                              <p:cond delay="250"/>
+                            </p:stCondLst>
+                            <p:childTnLst>
+                              <p:par>
+                                <p:cTn id="26" presetID="10" presetClass="entr" presetSubtype="0" fill="hold" nodeType="afterEffect">
+                                  <p:stCondLst>
+                                    <p:cond delay="0"/>
+                                  </p:stCondLst>
+                                  <p:childTnLst>
+                                    <p:set>
+                                      <p:cBhvr>
+                                        <p:cTn id="27" dur="1" fill="hold">
+                                          <p:stCondLst>
+                                            <p:cond delay="0"/>
+                                          </p:stCondLst>
+                                        </p:cTn>
+                                        <p:tgtEl>
+                                          <p:spTgt spid="18"/>
+                                        </p:tgtEl>
+                                        <p:attrNameLst>
+                                          <p:attrName>style.visibility</p:attrName>
+                                        </p:attrNameLst>
+                                      </p:cBhvr>
+                                      <p:to>
+                                        <p:strVal val="visible"/>
+                                      </p:to>
+                                    </p:set>
+                                    <p:animEffect transition="in" filter="fade">
+                                      <p:cBhvr>
+                                        <p:cTn id="28" dur="500"/>
+                                        <p:tgtEl>
+                                          <p:spTgt spid="18"/>
+                                        </p:tgtEl>
+                                      </p:cBhvr>
+                                    </p:animEffect>
+                                  </p:childTnLst>
+                                </p:cTn>
+                              </p:par>
+                            </p:childTnLst>
+                          </p:cTn>
+                        </p:par>
+                        <p:par>
+                          <p:cTn id="29" fill="hold">
+                            <p:stCondLst>
+                              <p:cond delay="750"/>
+                            </p:stCondLst>
+                            <p:childTnLst>
+                              <p:par>
+                                <p:cTn id="30" presetID="10" presetClass="entr" presetSubtype="0" fill="hold" nodeType="afterEffect">
+                                  <p:stCondLst>
+                                    <p:cond delay="0"/>
+                                  </p:stCondLst>
+                                  <p:childTnLst>
+                                    <p:set>
+                                      <p:cBhvr>
+                                        <p:cTn id="31" dur="1" fill="hold">
+                                          <p:stCondLst>
+                                            <p:cond delay="0"/>
+                                          </p:stCondLst>
+                                        </p:cTn>
+                                        <p:tgtEl>
+                                          <p:spTgt spid="12"/>
+                                        </p:tgtEl>
+                                        <p:attrNameLst>
+                                          <p:attrName>style.visibility</p:attrName>
+                                        </p:attrNameLst>
+                                      </p:cBhvr>
+                                      <p:to>
+                                        <p:strVal val="visible"/>
+                                      </p:to>
+                                    </p:set>
+                                    <p:animEffect transition="in" filter="fade">
+                                      <p:cBhvr>
+                                        <p:cTn id="32" dur="500"/>
+                                        <p:tgtEl>
+                                          <p:spTgt spid="12"/>
+                                        </p:tgtEl>
+                                      </p:cBhvr>
+                                    </p:animEffect>
+                                  </p:childTnLst>
+                                </p:cTn>
+                              </p:par>
+                              <p:par>
+                                <p:cTn id="33" presetID="10" presetClass="entr" presetSubtype="0" fill="hold" nodeType="withEffect">
+                                  <p:stCondLst>
+                                    <p:cond delay="0"/>
+                                  </p:stCondLst>
+                                  <p:childTnLst>
+                                    <p:set>
+                                      <p:cBhvr>
+                                        <p:cTn id="34" dur="1" fill="hold">
+                                          <p:stCondLst>
+                                            <p:cond delay="0"/>
+                                          </p:stCondLst>
+                                        </p:cTn>
+                                        <p:tgtEl>
+                                          <p:spTgt spid="13"/>
+                                        </p:tgtEl>
+                                        <p:attrNameLst>
+                                          <p:attrName>style.visibility</p:attrName>
+                                        </p:attrNameLst>
+                                      </p:cBhvr>
+                                      <p:to>
+                                        <p:strVal val="visible"/>
+                                      </p:to>
+                                    </p:set>
+                                    <p:animEffect transition="in" filter="fade">
+                                      <p:cBhvr>
+                                        <p:cTn id="35" dur="500"/>
+                                        <p:tgtEl>
+                                          <p:spTgt spid="13"/>
+                                        </p:tgtEl>
+                                      </p:cBhvr>
+                                    </p:animEffect>
+                                  </p:childTnLst>
+                                </p:cTn>
+                              </p:par>
+                              <p:par>
+                                <p:cTn id="36" presetID="10" presetClass="entr" presetSubtype="0" fill="hold" nodeType="withEffect">
+                                  <p:stCondLst>
+                                    <p:cond delay="0"/>
+                                  </p:stCondLst>
+                                  <p:childTnLst>
+                                    <p:set>
+                                      <p:cBhvr>
+                                        <p:cTn id="37" dur="1" fill="hold">
+                                          <p:stCondLst>
+                                            <p:cond delay="0"/>
+                                          </p:stCondLst>
+                                        </p:cTn>
+                                        <p:tgtEl>
+                                          <p:spTgt spid="14"/>
+                                        </p:tgtEl>
+                                        <p:attrNameLst>
+                                          <p:attrName>style.visibility</p:attrName>
+                                        </p:attrNameLst>
+                                      </p:cBhvr>
+                                      <p:to>
+                                        <p:strVal val="visible"/>
+                                      </p:to>
+                                    </p:set>
+                                    <p:animEffect transition="in" filter="fade">
+                                      <p:cBhvr>
+                                        <p:cTn id="38" dur="500"/>
+                                        <p:tgtEl>
+                                          <p:spTgt spid="14"/>
+                                        </p:tgtEl>
+                                      </p:cBhvr>
+                                    </p:animEffect>
+                                  </p:childTnLst>
+                                </p:cTn>
+                              </p:par>
+                              <p:par>
+                                <p:cTn id="39" presetID="10" presetClass="entr" presetSubtype="0" fill="hold" nodeType="withEffect">
+                                  <p:stCondLst>
+                                    <p:cond delay="0"/>
+                                  </p:stCondLst>
+                                  <p:childTnLst>
+                                    <p:set>
+                                      <p:cBhvr>
+                                        <p:cTn id="40" dur="1" fill="hold">
+                                          <p:stCondLst>
+                                            <p:cond delay="0"/>
+                                          </p:stCondLst>
+                                        </p:cTn>
+                                        <p:tgtEl>
+                                          <p:spTgt spid="15"/>
+                                        </p:tgtEl>
+                                        <p:attrNameLst>
+                                          <p:attrName>style.visibility</p:attrName>
+                                        </p:attrNameLst>
+                                      </p:cBhvr>
+                                      <p:to>
+                                        <p:strVal val="visible"/>
+                                      </p:to>
+                                    </p:set>
+                                    <p:animEffect transition="in" filter="fade">
+                                      <p:cBhvr>
+                                        <p:cTn id="41" dur="500"/>
+                                        <p:tgtEl>
+                                          <p:spTgt spid="15"/>
+                                        </p:tgtEl>
+                                      </p:cBhvr>
+                                    </p:animEffect>
+                                  </p:childTnLst>
+                                </p:cTn>
+                              </p:par>
+                              <p:par>
+                                <p:cTn id="42" presetID="10" presetClass="entr" presetSubtype="0" fill="hold" nodeType="withEffect">
+                                  <p:stCondLst>
+                                    <p:cond delay="0"/>
+                                  </p:stCondLst>
+                                  <p:childTnLst>
+                                    <p:set>
+                                      <p:cBhvr>
+                                        <p:cTn id="43" dur="1" fill="hold">
+                                          <p:stCondLst>
+                                            <p:cond delay="0"/>
+                                          </p:stCondLst>
+                                        </p:cTn>
+                                        <p:tgtEl>
+                                          <p:spTgt spid="16"/>
+                                        </p:tgtEl>
+                                        <p:attrNameLst>
+                                          <p:attrName>style.visibility</p:attrName>
+                                        </p:attrNameLst>
+                                      </p:cBhvr>
+                                      <p:to>
+                                        <p:strVal val="visible"/>
+                                      </p:to>
+                                    </p:set>
+                                    <p:animEffect transition="in" filter="fade">
+                                      <p:cBhvr>
+                                        <p:cTn id="44" dur="500"/>
+                                        <p:tgtEl>
+                                          <p:spTgt spid="16"/>
+                                        </p:tgtEl>
+                                      </p:cBhvr>
+                                    </p:animEffect>
+                                  </p:childTnLst>
+                                </p:cTn>
+                              </p:par>
+                            </p:childTnLst>
+                          </p:cTn>
+                        </p:par>
+                        <p:par>
+                          <p:cTn id="45" fill="hold">
+                            <p:stCondLst>
+                              <p:cond delay="1250"/>
+                            </p:stCondLst>
+                            <p:childTnLst>
+                              <p:par>
+                                <p:cTn id="46" presetID="10" presetClass="entr" presetSubtype="0" fill="hold" grpId="1" nodeType="afterEffect">
+                                  <p:stCondLst>
+                                    <p:cond delay="0"/>
+                                  </p:stCondLst>
+                                  <p:childTnLst>
+                                    <p:set>
+                                      <p:cBhvr>
+                                        <p:cTn id="47" dur="1" fill="hold">
+                                          <p:stCondLst>
+                                            <p:cond delay="0"/>
+                                          </p:stCondLst>
+                                        </p:cTn>
+                                        <p:tgtEl>
+                                          <p:spTgt spid="2"/>
+                                        </p:tgtEl>
+                                        <p:attrNameLst>
+                                          <p:attrName>style.visibility</p:attrName>
+                                        </p:attrNameLst>
+                                      </p:cBhvr>
+                                      <p:to>
+                                        <p:strVal val="visible"/>
+                                      </p:to>
+                                    </p:set>
+                                    <p:animEffect transition="in" filter="fade">
+                                      <p:cBhvr>
+                                        <p:cTn id="48" dur="500"/>
+                                        <p:tgtEl>
+                                          <p:spTgt spid="2"/>
+                                        </p:tgtEl>
+                                      </p:cBhvr>
+                                    </p:animEffect>
+                                  </p:childTnLst>
+                                </p:cTn>
+                              </p:par>
+                            </p:childTnLst>
+                          </p:cTn>
+                        </p:par>
+                        <p:par>
+                          <p:cTn id="49" fill="hold">
+                            <p:stCondLst>
+                              <p:cond delay="1750"/>
+                            </p:stCondLst>
+                            <p:childTnLst>
+                              <p:par>
+                                <p:cTn id="50" presetID="10" presetClass="entr" presetSubtype="0" fill="hold" grpId="1" nodeType="afterEffect">
+                                  <p:stCondLst>
+                                    <p:cond delay="0"/>
+                                  </p:stCondLst>
+                                  <p:childTnLst>
+                                    <p:set>
+                                      <p:cBhvr>
+                                        <p:cTn id="51" dur="1" fill="hold">
+                                          <p:stCondLst>
+                                            <p:cond delay="0"/>
+                                          </p:stCondLst>
+                                        </p:cTn>
+                                        <p:tgtEl>
+                                          <p:spTgt spid="4"/>
+                                        </p:tgtEl>
+                                        <p:attrNameLst>
+                                          <p:attrName>style.visibility</p:attrName>
+                                        </p:attrNameLst>
+                                      </p:cBhvr>
+                                      <p:to>
+                                        <p:strVal val="visible"/>
+                                      </p:to>
+                                    </p:set>
+                                    <p:animEffect transition="in" filter="fade">
+                                      <p:cBhvr>
+                                        <p:cTn id="52" dur="500"/>
+                                        <p:tgtEl>
+                                          <p:spTgt spid="4"/>
+                                        </p:tgtEl>
+                                      </p:cBhvr>
+                                    </p:animEffect>
+                                  </p:childTnLst>
+                                </p:cTn>
+                              </p:par>
+                            </p:childTnLst>
+                          </p:cTn>
+                        </p:par>
+                      </p:childTnLst>
+                    </p:cTn>
+                  </p:par>
+                  <p:par>
+                    <p:cTn id="53" fill="hold">
+                      <p:stCondLst>
+                        <p:cond delay="indefinite"/>
+                      </p:stCondLst>
+                      <p:childTnLst>
+                        <p:par>
+                          <p:cTn id="54" fill="hold">
+                            <p:stCondLst>
+                              <p:cond delay="0"/>
+                            </p:stCondLst>
+                            <p:childTnLst>
+                              <p:par>
+                                <p:cTn id="55" presetID="3" presetClass="emph" presetSubtype="2" fill="hold" grpId="0" nodeType="clickEffect">
+                                  <p:stCondLst>
+                                    <p:cond delay="0"/>
+                                  </p:stCondLst>
+                                  <p:childTnLst>
+                                    <p:animClr clrSpc="rgb" dir="cw">
+                                      <p:cBhvr override="childStyle">
+                                        <p:cTn id="56" dur="500" fill="hold"/>
+                                        <p:tgtEl>
+                                          <p:spTgt spid="2"/>
+                                        </p:tgtEl>
+                                        <p:attrNameLst>
+                                          <p:attrName>style.color</p:attrName>
+                                        </p:attrNameLst>
+                                      </p:cBhvr>
+                                      <p:to>
+                                        <a:srgbClr val="CC0000"/>
+                                      </p:to>
+                                    </p:animClr>
+                                  </p:childTnLst>
+                                </p:cTn>
+                              </p:par>
+                              <p:par>
+                                <p:cTn id="57" presetID="7" presetClass="emph" presetSubtype="2" fill="hold" nodeType="withEffect">
+                                  <p:stCondLst>
+                                    <p:cond delay="0"/>
+                                  </p:stCondLst>
+                                  <p:childTnLst>
+                                    <p:animClr clrSpc="rgb" dir="cw">
+                                      <p:cBhvr>
+                                        <p:cTn id="58" dur="500" fill="hold"/>
+                                        <p:tgtEl>
+                                          <p:spTgt spid="12"/>
+                                        </p:tgtEl>
+                                        <p:attrNameLst>
+                                          <p:attrName>stroke.color</p:attrName>
+                                        </p:attrNameLst>
+                                      </p:cBhvr>
+                                      <p:to>
+                                        <a:srgbClr val="CC0000"/>
+                                      </p:to>
+                                    </p:animClr>
+                                    <p:set>
+                                      <p:cBhvr>
+                                        <p:cTn id="59" dur="500" fill="hold"/>
+                                        <p:tgtEl>
+                                          <p:spTgt spid="12"/>
+                                        </p:tgtEl>
+                                        <p:attrNameLst>
+                                          <p:attrName>stroke.on</p:attrName>
+                                        </p:attrNameLst>
+                                      </p:cBhvr>
+                                      <p:to>
+                                        <p:strVal val="true"/>
+                                      </p:to>
+                                    </p:set>
+                                  </p:childTnLst>
+                                </p:cTn>
+                              </p:par>
+                              <p:par>
+                                <p:cTn id="60" presetID="7" presetClass="emph" presetSubtype="2" fill="hold" nodeType="withEffect">
+                                  <p:stCondLst>
+                                    <p:cond delay="0"/>
+                                  </p:stCondLst>
+                                  <p:childTnLst>
+                                    <p:animClr clrSpc="rgb" dir="cw">
+                                      <p:cBhvr>
+                                        <p:cTn id="61" dur="500" fill="hold"/>
+                                        <p:tgtEl>
+                                          <p:spTgt spid="13"/>
+                                        </p:tgtEl>
+                                        <p:attrNameLst>
+                                          <p:attrName>stroke.color</p:attrName>
+                                        </p:attrNameLst>
+                                      </p:cBhvr>
+                                      <p:to>
+                                        <a:srgbClr val="CC0000"/>
+                                      </p:to>
+                                    </p:animClr>
+                                    <p:set>
+                                      <p:cBhvr>
+                                        <p:cTn id="62" dur="500" fill="hold"/>
+                                        <p:tgtEl>
+                                          <p:spTgt spid="13"/>
+                                        </p:tgtEl>
+                                        <p:attrNameLst>
+                                          <p:attrName>stroke.on</p:attrName>
+                                        </p:attrNameLst>
+                                      </p:cBhvr>
+                                      <p:to>
+                                        <p:strVal val="true"/>
+                                      </p:to>
+                                    </p:set>
+                                  </p:childTnLst>
+                                </p:cTn>
+                              </p:par>
+                              <p:par>
+                                <p:cTn id="63" presetID="7" presetClass="emph" presetSubtype="2" fill="hold" nodeType="withEffect">
+                                  <p:stCondLst>
+                                    <p:cond delay="0"/>
+                                  </p:stCondLst>
+                                  <p:childTnLst>
+                                    <p:animClr clrSpc="rgb" dir="cw">
+                                      <p:cBhvr>
+                                        <p:cTn id="64" dur="500" fill="hold"/>
+                                        <p:tgtEl>
+                                          <p:spTgt spid="14"/>
+                                        </p:tgtEl>
+                                        <p:attrNameLst>
+                                          <p:attrName>stroke.color</p:attrName>
+                                        </p:attrNameLst>
+                                      </p:cBhvr>
+                                      <p:to>
+                                        <a:srgbClr val="CC0000"/>
+                                      </p:to>
+                                    </p:animClr>
+                                    <p:set>
+                                      <p:cBhvr>
+                                        <p:cTn id="65" dur="500" fill="hold"/>
+                                        <p:tgtEl>
+                                          <p:spTgt spid="14"/>
+                                        </p:tgtEl>
+                                        <p:attrNameLst>
+                                          <p:attrName>stroke.on</p:attrName>
+                                        </p:attrNameLst>
+                                      </p:cBhvr>
+                                      <p:to>
+                                        <p:strVal val="true"/>
+                                      </p:to>
+                                    </p:set>
+                                  </p:childTnLst>
+                                </p:cTn>
+                              </p:par>
+                              <p:par>
+                                <p:cTn id="66" presetID="7" presetClass="emph" presetSubtype="2" fill="hold" nodeType="withEffect">
+                                  <p:stCondLst>
+                                    <p:cond delay="0"/>
+                                  </p:stCondLst>
+                                  <p:childTnLst>
+                                    <p:animClr clrSpc="rgb" dir="cw">
+                                      <p:cBhvr>
+                                        <p:cTn id="67" dur="500" fill="hold"/>
+                                        <p:tgtEl>
+                                          <p:spTgt spid="15"/>
+                                        </p:tgtEl>
+                                        <p:attrNameLst>
+                                          <p:attrName>stroke.color</p:attrName>
+                                        </p:attrNameLst>
+                                      </p:cBhvr>
+                                      <p:to>
+                                        <a:srgbClr val="CC0000"/>
+                                      </p:to>
+                                    </p:animClr>
+                                    <p:set>
+                                      <p:cBhvr>
+                                        <p:cTn id="68" dur="500" fill="hold"/>
+                                        <p:tgtEl>
+                                          <p:spTgt spid="15"/>
+                                        </p:tgtEl>
+                                        <p:attrNameLst>
+                                          <p:attrName>stroke.on</p:attrName>
+                                        </p:attrNameLst>
+                                      </p:cBhvr>
+                                      <p:to>
+                                        <p:strVal val="true"/>
+                                      </p:to>
+                                    </p:set>
+                                  </p:childTnLst>
+                                </p:cTn>
+                              </p:par>
+                              <p:par>
+                                <p:cTn id="69" presetID="7" presetClass="emph" presetSubtype="2" fill="hold" nodeType="withEffect">
+                                  <p:stCondLst>
+                                    <p:cond delay="0"/>
+                                  </p:stCondLst>
+                                  <p:childTnLst>
+                                    <p:animClr clrSpc="rgb" dir="cw">
+                                      <p:cBhvr>
+                                        <p:cTn id="70" dur="500" fill="hold"/>
+                                        <p:tgtEl>
+                                          <p:spTgt spid="16"/>
+                                        </p:tgtEl>
+                                        <p:attrNameLst>
+                                          <p:attrName>stroke.color</p:attrName>
+                                        </p:attrNameLst>
+                                      </p:cBhvr>
+                                      <p:to>
+                                        <a:srgbClr val="CC0000"/>
+                                      </p:to>
+                                    </p:animClr>
+                                    <p:set>
+                                      <p:cBhvr>
+                                        <p:cTn id="71" dur="500" fill="hold"/>
+                                        <p:tgtEl>
+                                          <p:spTgt spid="16"/>
+                                        </p:tgtEl>
+                                        <p:attrNameLst>
+                                          <p:attrName>stroke.on</p:attrName>
+                                        </p:attrNameLst>
+                                      </p:cBhvr>
+                                      <p:to>
+                                        <p:strVal val="true"/>
+                                      </p:to>
+                                    </p:set>
+                                  </p:childTnLst>
+                                </p:cTn>
+                              </p:par>
+                            </p:childTnLst>
+                          </p:cTn>
+                        </p:par>
+                      </p:childTnLst>
+                    </p:cTn>
+                  </p:par>
+                  <p:par>
+                    <p:cTn id="72" fill="hold">
+                      <p:stCondLst>
+                        <p:cond delay="indefinite"/>
+                      </p:stCondLst>
+                      <p:childTnLst>
+                        <p:par>
+                          <p:cTn id="73" fill="hold">
+                            <p:stCondLst>
+                              <p:cond delay="0"/>
+                            </p:stCondLst>
+                            <p:childTnLst>
+                              <p:par>
+                                <p:cTn id="74" presetID="3" presetClass="emph" presetSubtype="2" fill="hold" grpId="0" nodeType="clickEffect">
+                                  <p:stCondLst>
+                                    <p:cond delay="0"/>
+                                  </p:stCondLst>
+                                  <p:childTnLst>
+                                    <p:animClr clrSpc="rgb" dir="cw">
+                                      <p:cBhvr override="childStyle">
+                                        <p:cTn id="75" dur="500" fill="hold"/>
+                                        <p:tgtEl>
+                                          <p:spTgt spid="4"/>
+                                        </p:tgtEl>
+                                        <p:attrNameLst>
+                                          <p:attrName>style.color</p:attrName>
+                                        </p:attrNameLst>
+                                      </p:cBhvr>
+                                      <p:to>
+                                        <a:srgbClr val="800080"/>
+                                      </p:to>
+                                    </p:animClr>
+                                  </p:childTnLst>
+                                </p:cTn>
+                              </p:par>
+                              <p:par>
+                                <p:cTn id="76" presetID="10" presetClass="entr" presetSubtype="0" fill="hold" nodeType="withEffect">
+                                  <p:stCondLst>
+                                    <p:cond delay="0"/>
+                                  </p:stCondLst>
+                                  <p:childTnLst>
+                                    <p:set>
+                                      <p:cBhvr>
+                                        <p:cTn id="77" dur="1" fill="hold">
+                                          <p:stCondLst>
+                                            <p:cond delay="0"/>
+                                          </p:stCondLst>
+                                        </p:cTn>
+                                        <p:tgtEl>
+                                          <p:spTgt spid="21"/>
+                                        </p:tgtEl>
+                                        <p:attrNameLst>
+                                          <p:attrName>style.visibility</p:attrName>
+                                        </p:attrNameLst>
+                                      </p:cBhvr>
+                                      <p:to>
+                                        <p:strVal val="visible"/>
+                                      </p:to>
+                                    </p:set>
+                                    <p:animEffect transition="in" filter="fade">
+                                      <p:cBhvr>
+                                        <p:cTn id="78" dur="500"/>
+                                        <p:tgtEl>
+                                          <p:spTgt spid="21"/>
+                                        </p:tgtEl>
+                                      </p:cBhvr>
+                                    </p:animEffect>
+                                  </p:childTnLst>
+                                </p:cTn>
+                              </p:par>
+                            </p:childTnLst>
+                          </p:cTn>
+                        </p:par>
+                      </p:childTnLst>
+                    </p:cTn>
+                  </p:par>
+                </p:childTnLst>
+              </p:cTn>
+              <p:prevCondLst>
+                <p:cond evt="onPrev" delay="0">
+                  <p:tgtEl>
+                    <p:sldTgt/>
+                  </p:tgtEl>
+                </p:cond>
+              </p:prevCondLst>
+              <p:nextCondLst>
+                <p:cond evt="onNext" delay="0">
+                  <p:tgtEl>
+                    <p:sldTgt/>
+                  </p:tgtEl>
+                </p:cond>
+              </p:nextCondLst>
+            </p:seq>
+          </p:childTnLst>
+        </p:cTn>
+      </p:par>
+    </p:tnLst>
+    <p:bldLst>
+      <p:bldP spid="27" grpId="0" animBg="1"/>
+      <p:bldP spid="28" grpId="0" animBg="1"/>
+      <p:bldP spid="29" grpId="0"/>
+      <p:bldP spid="30" grpId="0"/>
+      <p:bldP spid="2" grpId="0"/>
+      <p:bldP spid="2" grpId="1"/>
+      <p:bldP spid="4" grpId="0"/>
+      <p:bldP spid="4" grpId="1"/>
+    </p:bldLst>
+  </p:timing>
 </p:sld>
 </file>
 

</xml_diff>